<commit_message>
rumor detection phase III
</commit_message>
<xml_diff>
--- a/580presentation.pptx
+++ b/580presentation.pptx
@@ -4130,6 +4130,7 @@
           </a:lstStyle>
           <a:p>
             <a:r>
+              <a:rPr dirty="0"/>
               <a:t>Rumor Classifier</a:t>
             </a:r>
           </a:p>
@@ -7287,7 +7288,7 @@
           <a:graphicData uri="http://schemas.openxmlformats.org/presentationml/2006/ole">
             <mc:AlternateContent xmlns:mc="http://schemas.openxmlformats.org/markup-compatibility/2006">
               <mc:Choice xmlns:v="urn:schemas-microsoft-com:vml" Requires="v">
-                <p:oleObj spid="_x0000_s1038" name="Equation" r:id="rId5" imgW="1841400" imgH="203040" progId="Equation.DSMT4">
+                <p:oleObj spid="_x0000_s1053" name="Equation" r:id="rId5" imgW="1841400" imgH="203040" progId="Equation.DSMT4">
                   <p:embed/>
                 </p:oleObj>
               </mc:Choice>
@@ -7350,7 +7351,7 @@
           <a:graphicData uri="http://schemas.openxmlformats.org/presentationml/2006/ole">
             <mc:AlternateContent xmlns:mc="http://schemas.openxmlformats.org/markup-compatibility/2006">
               <mc:Choice xmlns:v="urn:schemas-microsoft-com:vml" Requires="v">
-                <p:oleObj spid="_x0000_s1039" name="Equation" r:id="rId7" imgW="812520" imgH="228600" progId="Equation.DSMT4">
+                <p:oleObj spid="_x0000_s1054" name="Equation" r:id="rId7" imgW="812520" imgH="228600" progId="Equation.DSMT4">
                   <p:embed/>
                 </p:oleObj>
               </mc:Choice>
@@ -7466,7 +7467,7 @@
           <a:graphicData uri="http://schemas.openxmlformats.org/presentationml/2006/ole">
             <mc:AlternateContent xmlns:mc="http://schemas.openxmlformats.org/markup-compatibility/2006">
               <mc:Choice xmlns:v="urn:schemas-microsoft-com:vml" Requires="v">
-                <p:oleObj spid="_x0000_s1040" name="Equation" r:id="rId9" imgW="1688760" imgH="279360" progId="Equation.DSMT4">
+                <p:oleObj spid="_x0000_s1055" name="Equation" r:id="rId9" imgW="1688760" imgH="279360" progId="Equation.DSMT4">
                   <p:embed/>
                 </p:oleObj>
               </mc:Choice>
@@ -8592,12 +8593,93 @@
           </a:p>
         </p:txBody>
       </p:sp>
+      <p:sp>
+        <p:nvSpPr>
+          <p:cNvPr id="9" name="文本框 8">
+            <a:extLst>
+              <a:ext uri="{FF2B5EF4-FFF2-40B4-BE49-F238E27FC236}">
+                <a16:creationId xmlns:a16="http://schemas.microsoft.com/office/drawing/2014/main" id="{ECBC0899-ACB6-4D0C-A8B7-A552BB8863B3}"/>
+              </a:ext>
+            </a:extLst>
+          </p:cNvPr>
+          <p:cNvSpPr txBox="1"/>
+          <p:nvPr/>
+        </p:nvSpPr>
+        <p:spPr>
+          <a:xfrm>
+            <a:off x="0" y="6365029"/>
+            <a:ext cx="10422294" cy="461665"/>
+          </a:xfrm>
+          <a:prstGeom prst="rect">
+            <a:avLst/>
+          </a:prstGeom>
+          <a:noFill/>
+        </p:spPr>
+        <p:txBody>
+          <a:bodyPr wrap="square" rtlCol="0">
+            <a:spAutoFit/>
+          </a:bodyPr>
+          <a:lstStyle/>
+          <a:p>
+            <a:pPr>
+              <a:defRPr sz="1200">
+                <a:latin typeface="+mn-lt"/>
+                <a:ea typeface="+mn-ea"/>
+                <a:cs typeface="+mn-cs"/>
+                <a:sym typeface="Helvetica"/>
+              </a:defRPr>
+            </a:pPr>
+            <a:r>
+              <a:rPr lang="en-US" altLang="zh-CN" sz="1200" dirty="0">
+                <a:latin typeface="微软雅黑"/>
+                <a:ea typeface="微软雅黑"/>
+                <a:cs typeface="+mn-cs"/>
+              </a:rPr>
+              <a:t>Citing: </a:t>
+            </a:r>
+          </a:p>
+          <a:p>
+            <a:pPr>
+              <a:defRPr sz="1200">
+                <a:latin typeface="+mn-lt"/>
+                <a:ea typeface="+mn-ea"/>
+                <a:cs typeface="+mn-cs"/>
+                <a:sym typeface="Helvetica"/>
+              </a:defRPr>
+            </a:pPr>
+            <a:r>
+              <a:rPr lang="en-US" altLang="zh-CN" sz="1200" dirty="0">
+                <a:latin typeface="微软雅黑"/>
+                <a:ea typeface="微软雅黑"/>
+                <a:cs typeface="+mn-cs"/>
+              </a:rPr>
+              <a:t>Doersch, C. (2016). Tutorial on Variational Autoencoders. </a:t>
+            </a:r>
+            <a:r>
+              <a:rPr lang="en-US" altLang="zh-CN" sz="1200" dirty="0" err="1">
+                <a:latin typeface="微软雅黑"/>
+                <a:ea typeface="微软雅黑"/>
+                <a:cs typeface="+mn-cs"/>
+              </a:rPr>
+              <a:t>ArXiv</a:t>
+            </a:r>
+            <a:r>
+              <a:rPr lang="en-US" altLang="zh-CN" sz="1200" dirty="0">
+                <a:latin typeface="微软雅黑"/>
+                <a:ea typeface="微软雅黑"/>
+                <a:cs typeface="+mn-cs"/>
+              </a:rPr>
+              <a:t>, abs/1606.05908.</a:t>
+            </a:r>
+          </a:p>
+        </p:txBody>
+      </p:sp>
       <p:pic>
         <p:nvPicPr>
-          <p:cNvPr id="15" name="图片 14">
+          <p:cNvPr id="3" name="图片 2">
             <a:extLst>
               <a:ext uri="{FF2B5EF4-FFF2-40B4-BE49-F238E27FC236}">
-                <a16:creationId xmlns:a16="http://schemas.microsoft.com/office/drawing/2014/main" id="{F55EECD3-BDF0-42B1-8CA6-2989D26B86E7}"/>
+                <a16:creationId xmlns:a16="http://schemas.microsoft.com/office/drawing/2014/main" id="{EC17C6DB-7BEF-4625-A457-C13BD5893BB3}"/>
               </a:ext>
             </a:extLst>
           </p:cNvPr>
@@ -8608,16 +8690,13 @@
         </p:nvPicPr>
         <p:blipFill>
           <a:blip r:embed="rId4">
-            <a:clrChange>
-              <a:clrFrom>
-                <a:srgbClr val="FAFAFA"/>
-              </a:clrFrom>
-              <a:clrTo>
-                <a:srgbClr val="FAFAFA">
-                  <a:alpha val="0"/>
-                </a:srgbClr>
-              </a:clrTo>
-            </a:clrChange>
+            <a:duotone>
+              <a:prstClr val="black"/>
+              <a:schemeClr val="bg1">
+                <a:tint val="45000"/>
+                <a:satMod val="400000"/>
+              </a:schemeClr>
+            </a:duotone>
             <a:extLst>
               <a:ext uri="{28A0092B-C50C-407E-A947-70E740481C1C}">
                 <a14:useLocalDpi xmlns:a14="http://schemas.microsoft.com/office/drawing/2010/main" val="0"/>
@@ -8630,8 +8709,8 @@
         </p:blipFill>
         <p:spPr>
           <a:xfrm>
-            <a:off x="7474416" y="1763486"/>
-            <a:ext cx="4222595" cy="3997390"/>
+            <a:off x="7465086" y="1646908"/>
+            <a:ext cx="4219241" cy="3994215"/>
           </a:xfrm>
           <a:prstGeom prst="rect">
             <a:avLst/>
@@ -8666,7 +8745,7 @@
         </p:blipFill>
         <p:spPr>
           <a:xfrm>
-            <a:off x="7949679" y="3306002"/>
+            <a:off x="7949680" y="3183005"/>
             <a:ext cx="494524" cy="245994"/>
           </a:xfrm>
           <a:prstGeom prst="rect">
@@ -8702,7 +8781,7 @@
         </p:blipFill>
         <p:spPr>
           <a:xfrm>
-            <a:off x="9394531" y="3306002"/>
+            <a:off x="9385104" y="3183005"/>
             <a:ext cx="524514" cy="270539"/>
           </a:xfrm>
           <a:prstGeom prst="rect">
@@ -8710,87 +8789,6 @@
           </a:prstGeom>
         </p:spPr>
       </p:pic>
-      <p:sp>
-        <p:nvSpPr>
-          <p:cNvPr id="9" name="文本框 8">
-            <a:extLst>
-              <a:ext uri="{FF2B5EF4-FFF2-40B4-BE49-F238E27FC236}">
-                <a16:creationId xmlns:a16="http://schemas.microsoft.com/office/drawing/2014/main" id="{ECBC0899-ACB6-4D0C-A8B7-A552BB8863B3}"/>
-              </a:ext>
-            </a:extLst>
-          </p:cNvPr>
-          <p:cNvSpPr txBox="1"/>
-          <p:nvPr/>
-        </p:nvSpPr>
-        <p:spPr>
-          <a:xfrm>
-            <a:off x="0" y="6365029"/>
-            <a:ext cx="10422294" cy="461665"/>
-          </a:xfrm>
-          <a:prstGeom prst="rect">
-            <a:avLst/>
-          </a:prstGeom>
-          <a:noFill/>
-        </p:spPr>
-        <p:txBody>
-          <a:bodyPr wrap="square" rtlCol="0">
-            <a:spAutoFit/>
-          </a:bodyPr>
-          <a:lstStyle/>
-          <a:p>
-            <a:pPr>
-              <a:defRPr sz="1200">
-                <a:latin typeface="+mn-lt"/>
-                <a:ea typeface="+mn-ea"/>
-                <a:cs typeface="+mn-cs"/>
-                <a:sym typeface="Helvetica"/>
-              </a:defRPr>
-            </a:pPr>
-            <a:r>
-              <a:rPr lang="en-US" altLang="zh-CN" sz="1200" dirty="0">
-                <a:latin typeface="微软雅黑"/>
-                <a:ea typeface="微软雅黑"/>
-                <a:cs typeface="+mn-cs"/>
-              </a:rPr>
-              <a:t>Citing: </a:t>
-            </a:r>
-          </a:p>
-          <a:p>
-            <a:pPr>
-              <a:defRPr sz="1200">
-                <a:latin typeface="+mn-lt"/>
-                <a:ea typeface="+mn-ea"/>
-                <a:cs typeface="+mn-cs"/>
-                <a:sym typeface="Helvetica"/>
-              </a:defRPr>
-            </a:pPr>
-            <a:r>
-              <a:rPr lang="en-US" altLang="zh-CN" sz="1200" dirty="0">
-                <a:latin typeface="微软雅黑"/>
-                <a:ea typeface="微软雅黑"/>
-                <a:cs typeface="+mn-cs"/>
-              </a:rPr>
-              <a:t>Doersch, C. (2016). Tutorial on Variational Autoencoders. </a:t>
-            </a:r>
-            <a:r>
-              <a:rPr lang="en-US" altLang="zh-CN" sz="1200" dirty="0" err="1">
-                <a:latin typeface="微软雅黑"/>
-                <a:ea typeface="微软雅黑"/>
-                <a:cs typeface="+mn-cs"/>
-              </a:rPr>
-              <a:t>ArXiv</a:t>
-            </a:r>
-            <a:r>
-              <a:rPr lang="en-US" altLang="zh-CN" sz="1200" dirty="0">
-                <a:latin typeface="微软雅黑"/>
-                <a:ea typeface="微软雅黑"/>
-                <a:cs typeface="+mn-cs"/>
-              </a:rPr>
-              <a:t>, abs/1606.05908.</a:t>
-            </a:r>
-          </a:p>
-        </p:txBody>
-      </p:sp>
     </p:spTree>
     <p:extLst>
       <p:ext uri="{BB962C8B-B14F-4D97-AF65-F5344CB8AC3E}">
@@ -8834,7 +8832,7 @@
                             </p:stCondLst>
                             <p:childTnLst>
                               <p:par>
-                                <p:cTn id="5" presetID="42" presetClass="entr" presetSubtype="0" fill="hold" grpId="0" nodeType="clickEffect">
+                                <p:cTn id="5" presetID="2" presetClass="entr" presetSubtype="4" fill="hold" grpId="0" nodeType="clickEffect">
                                   <p:stCondLst>
                                     <p:cond delay="0"/>
                                   </p:stCondLst>
@@ -8857,17 +8855,9 @@
                                         <p:strVal val="visible"/>
                                       </p:to>
                                     </p:set>
-                                    <p:animEffect transition="in" filter="fade">
-                                      <p:cBhvr>
-                                        <p:cTn id="7" dur="1000"/>
-                                        <p:tgtEl>
-                                          <p:spTgt spid="11"/>
-                                        </p:tgtEl>
-                                      </p:cBhvr>
-                                    </p:animEffect>
                                     <p:anim calcmode="lin" valueType="num">
-                                      <p:cBhvr>
-                                        <p:cTn id="8" dur="1000" fill="hold"/>
+                                      <p:cBhvr additive="base">
+                                        <p:cTn id="7" dur="500" fill="hold"/>
                                         <p:tgtEl>
                                           <p:spTgt spid="11"/>
                                         </p:tgtEl>
@@ -8889,8 +8879,8 @@
                                       </p:tavLst>
                                     </p:anim>
                                     <p:anim calcmode="lin" valueType="num">
-                                      <p:cBhvr>
-                                        <p:cTn id="9" dur="1000" fill="hold"/>
+                                      <p:cBhvr additive="base">
+                                        <p:cTn id="8" dur="500" fill="hold"/>
                                         <p:tgtEl>
                                           <p:spTgt spid="11"/>
                                         </p:tgtEl>
@@ -8901,7 +8891,7 @@
                                       <p:tavLst>
                                         <p:tav tm="0">
                                           <p:val>
-                                            <p:strVal val="#ppt_y+.1"/>
+                                            <p:strVal val="1+#ppt_h/2"/>
                                           </p:val>
                                         </p:tav>
                                         <p:tav tm="100000">
@@ -8915,14 +8905,14 @@
                                 </p:cTn>
                               </p:par>
                               <p:par>
-                                <p:cTn id="10" presetID="42" presetClass="entr" presetSubtype="0" fill="hold" nodeType="withEffect">
+                                <p:cTn id="9" presetID="2" presetClass="entr" presetSubtype="4" fill="hold" nodeType="withEffect">
                                   <p:stCondLst>
                                     <p:cond delay="0"/>
                                   </p:stCondLst>
                                   <p:childTnLst>
                                     <p:set>
                                       <p:cBhvr>
-                                        <p:cTn id="11" dur="1" fill="hold">
+                                        <p:cTn id="10" dur="1" fill="hold">
                                           <p:stCondLst>
                                             <p:cond delay="0"/>
                                           </p:stCondLst>
@@ -8938,17 +8928,9 @@
                                         <p:strVal val="visible"/>
                                       </p:to>
                                     </p:set>
-                                    <p:animEffect transition="in" filter="fade">
-                                      <p:cBhvr>
-                                        <p:cTn id="12" dur="1000"/>
-                                        <p:tgtEl>
-                                          <p:spTgt spid="20"/>
-                                        </p:tgtEl>
-                                      </p:cBhvr>
-                                    </p:animEffect>
                                     <p:anim calcmode="lin" valueType="num">
-                                      <p:cBhvr>
-                                        <p:cTn id="13" dur="1000" fill="hold"/>
+                                      <p:cBhvr additive="base">
+                                        <p:cTn id="11" dur="500" fill="hold"/>
                                         <p:tgtEl>
                                           <p:spTgt spid="20"/>
                                         </p:tgtEl>
@@ -8970,8 +8952,8 @@
                                       </p:tavLst>
                                     </p:anim>
                                     <p:anim calcmode="lin" valueType="num">
-                                      <p:cBhvr>
-                                        <p:cTn id="14" dur="1000" fill="hold"/>
+                                      <p:cBhvr additive="base">
+                                        <p:cTn id="12" dur="500" fill="hold"/>
                                         <p:tgtEl>
                                           <p:spTgt spid="20"/>
                                         </p:tgtEl>
@@ -8982,7 +8964,7 @@
                                       <p:tavLst>
                                         <p:tav tm="0">
                                           <p:val>
-                                            <p:strVal val="#ppt_y+.1"/>
+                                            <p:strVal val="1+#ppt_h/2"/>
                                           </p:val>
                                         </p:tav>
                                         <p:tav tm="100000">
@@ -8996,14 +8978,14 @@
                                 </p:cTn>
                               </p:par>
                               <p:par>
-                                <p:cTn id="15" presetID="42" presetClass="entr" presetSubtype="0" fill="hold" nodeType="withEffect">
+                                <p:cTn id="13" presetID="2" presetClass="entr" presetSubtype="4" fill="hold" nodeType="withEffect">
                                   <p:stCondLst>
                                     <p:cond delay="0"/>
                                   </p:stCondLst>
                                   <p:childTnLst>
                                     <p:set>
                                       <p:cBhvr>
-                                        <p:cTn id="16" dur="1" fill="hold">
+                                        <p:cTn id="14" dur="1" fill="hold">
                                           <p:stCondLst>
                                             <p:cond delay="0"/>
                                           </p:stCondLst>
@@ -9019,17 +9001,9 @@
                                         <p:strVal val="visible"/>
                                       </p:to>
                                     </p:set>
-                                    <p:animEffect transition="in" filter="fade">
-                                      <p:cBhvr>
-                                        <p:cTn id="17" dur="1000"/>
-                                        <p:tgtEl>
-                                          <p:spTgt spid="21"/>
-                                        </p:tgtEl>
-                                      </p:cBhvr>
-                                    </p:animEffect>
                                     <p:anim calcmode="lin" valueType="num">
-                                      <p:cBhvr>
-                                        <p:cTn id="18" dur="1000" fill="hold"/>
+                                      <p:cBhvr additive="base">
+                                        <p:cTn id="15" dur="500" fill="hold"/>
                                         <p:tgtEl>
                                           <p:spTgt spid="21"/>
                                         </p:tgtEl>
@@ -9051,8 +9025,8 @@
                                       </p:tavLst>
                                     </p:anim>
                                     <p:anim calcmode="lin" valueType="num">
-                                      <p:cBhvr>
-                                        <p:cTn id="19" dur="1000" fill="hold"/>
+                                      <p:cBhvr additive="base">
+                                        <p:cTn id="16" dur="500" fill="hold"/>
                                         <p:tgtEl>
                                           <p:spTgt spid="21"/>
                                         </p:tgtEl>
@@ -9063,7 +9037,7 @@
                                       <p:tavLst>
                                         <p:tav tm="0">
                                           <p:val>
-                                            <p:strVal val="#ppt_y+.1"/>
+                                            <p:strVal val="1+#ppt_h/2"/>
                                           </p:val>
                                         </p:tav>
                                         <p:tav tm="100000">
@@ -9077,20 +9051,20 @@
                                 </p:cTn>
                               </p:par>
                               <p:par>
-                                <p:cTn id="20" presetID="42" presetClass="entr" presetSubtype="0" fill="hold" nodeType="withEffect">
+                                <p:cTn id="17" presetID="2" presetClass="entr" presetSubtype="4" fill="hold" nodeType="withEffect">
                                   <p:stCondLst>
                                     <p:cond delay="0"/>
                                   </p:stCondLst>
                                   <p:childTnLst>
                                     <p:set>
                                       <p:cBhvr>
-                                        <p:cTn id="21" dur="1" fill="hold">
+                                        <p:cTn id="18" dur="1" fill="hold">
                                           <p:stCondLst>
                                             <p:cond delay="0"/>
                                           </p:stCondLst>
                                         </p:cTn>
                                         <p:tgtEl>
-                                          <p:spTgt spid="15"/>
+                                          <p:spTgt spid="3"/>
                                         </p:tgtEl>
                                         <p:attrNameLst>
                                           <p:attrName>style.visibility</p:attrName>
@@ -9100,19 +9074,11 @@
                                         <p:strVal val="visible"/>
                                       </p:to>
                                     </p:set>
-                                    <p:animEffect transition="in" filter="fade">
-                                      <p:cBhvr>
-                                        <p:cTn id="22" dur="1000"/>
+                                    <p:anim calcmode="lin" valueType="num">
+                                      <p:cBhvr additive="base">
+                                        <p:cTn id="19" dur="500" fill="hold"/>
                                         <p:tgtEl>
-                                          <p:spTgt spid="15"/>
-                                        </p:tgtEl>
-                                      </p:cBhvr>
-                                    </p:animEffect>
-                                    <p:anim calcmode="lin" valueType="num">
-                                      <p:cBhvr>
-                                        <p:cTn id="23" dur="1000" fill="hold"/>
-                                        <p:tgtEl>
-                                          <p:spTgt spid="15"/>
+                                          <p:spTgt spid="3"/>
                                         </p:tgtEl>
                                         <p:attrNameLst>
                                           <p:attrName>ppt_x</p:attrName>
@@ -9132,10 +9098,10 @@
                                       </p:tavLst>
                                     </p:anim>
                                     <p:anim calcmode="lin" valueType="num">
-                                      <p:cBhvr>
-                                        <p:cTn id="24" dur="1000" fill="hold"/>
+                                      <p:cBhvr additive="base">
+                                        <p:cTn id="20" dur="500" fill="hold"/>
                                         <p:tgtEl>
-                                          <p:spTgt spid="15"/>
+                                          <p:spTgt spid="3"/>
                                         </p:tgtEl>
                                         <p:attrNameLst>
                                           <p:attrName>ppt_y</p:attrName>
@@ -9144,7 +9110,7 @@
                                       <p:tavLst>
                                         <p:tav tm="0">
                                           <p:val>
-                                            <p:strVal val="#ppt_y+.1"/>
+                                            <p:strVal val="1+#ppt_h/2"/>
                                           </p:val>
                                         </p:tav>
                                         <p:tav tm="100000">
@@ -16651,10 +16617,10 @@
       </p:sp>
       <p:sp>
         <p:nvSpPr>
-          <p:cNvPr id="5" name="Rectangle: Rounded Corners 4">
+          <p:cNvPr id="28" name="Arrow: Right 27">
             <a:extLst>
               <a:ext uri="{FF2B5EF4-FFF2-40B4-BE49-F238E27FC236}">
-                <a16:creationId xmlns:a16="http://schemas.microsoft.com/office/drawing/2014/main" id="{5EAD2136-4C46-4CB5-9756-C26073BC6DC1}"/>
+                <a16:creationId xmlns:a16="http://schemas.microsoft.com/office/drawing/2014/main" id="{F1977F6F-C8C9-4D1E-9066-4D9E73F99A17}"/>
               </a:ext>
             </a:extLst>
           </p:cNvPr>
@@ -16663,714 +16629,27 @@
         </p:nvSpPr>
         <p:spPr>
           <a:xfrm>
-            <a:off x="1762764" y="1791092"/>
-            <a:ext cx="882522" cy="2809187"/>
-          </a:xfrm>
-          <a:prstGeom prst="roundRect">
-            <a:avLst/>
-          </a:prstGeom>
-          <a:solidFill>
-            <a:srgbClr val="FFCC66"/>
-          </a:solidFill>
-          <a:ln w="12700" cap="flat">
-            <a:solidFill>
-              <a:schemeClr val="accent1"/>
-            </a:solidFill>
-            <a:prstDash val="solid"/>
-            <a:miter lim="800000"/>
-          </a:ln>
-          <a:effectLst/>
-          <a:sp3d/>
-        </p:spPr>
-        <p:style>
-          <a:lnRef idx="0">
-            <a:scrgbClr r="0" g="0" b="0"/>
-          </a:lnRef>
-          <a:fillRef idx="0">
-            <a:scrgbClr r="0" g="0" b="0"/>
-          </a:fillRef>
-          <a:effectRef idx="0">
-            <a:scrgbClr r="0" g="0" b="0"/>
-          </a:effectRef>
-          <a:fontRef idx="none"/>
-        </p:style>
-        <p:txBody>
-          <a:bodyPr rot="0" spcFirstLastPara="1" vertOverflow="overflow" horzOverflow="overflow" vert="horz" wrap="square" lIns="45719" tIns="45719" rIns="45719" bIns="45719" numCol="1" spcCol="38100" rtlCol="0" anchor="ctr">
-            <a:spAutoFit/>
-          </a:bodyPr>
-          <a:lstStyle/>
-          <a:p>
-            <a:pPr marL="0" marR="0" indent="0" algn="l" defTabSz="914400" rtl="0" fontAlgn="auto" latinLnBrk="0" hangingPunct="0">
-              <a:lnSpc>
-                <a:spcPct val="100000"/>
-              </a:lnSpc>
-              <a:spcBef>
-                <a:spcPts val="0"/>
-              </a:spcBef>
-              <a:spcAft>
-                <a:spcPts val="0"/>
-              </a:spcAft>
-              <a:buClrTx/>
-              <a:buSzTx/>
-              <a:buFontTx/>
-              <a:buNone/>
-              <a:tabLst/>
-            </a:pPr>
-            <a:endParaRPr kumimoji="0" lang="zh-CN" altLang="en-US" sz="1800" b="0" i="0" u="none" strike="noStrike" cap="none" spc="0" normalizeH="0" baseline="0" dirty="0">
-              <a:ln>
-                <a:noFill/>
-              </a:ln>
-              <a:solidFill>
-                <a:srgbClr val="000000"/>
-              </a:solidFill>
-              <a:effectLst/>
-              <a:uFillTx/>
-              <a:latin typeface="+mj-lt"/>
-              <a:ea typeface="+mj-ea"/>
-              <a:cs typeface="+mj-cs"/>
-              <a:sym typeface="等线"/>
-            </a:endParaRPr>
-          </a:p>
-        </p:txBody>
-      </p:sp>
-      <p:sp>
-        <p:nvSpPr>
-          <p:cNvPr id="9" name="TextBox 8">
-            <a:extLst>
-              <a:ext uri="{FF2B5EF4-FFF2-40B4-BE49-F238E27FC236}">
-                <a16:creationId xmlns:a16="http://schemas.microsoft.com/office/drawing/2014/main" id="{7E2A3522-F6A5-4DA2-AEF3-7B4106085DA9}"/>
-              </a:ext>
-            </a:extLst>
-          </p:cNvPr>
-          <p:cNvSpPr txBox="1"/>
-          <p:nvPr/>
-        </p:nvSpPr>
-        <p:spPr>
-          <a:xfrm>
-            <a:off x="2034254" y="1918413"/>
-            <a:ext cx="427359" cy="2554543"/>
-          </a:xfrm>
-          <a:prstGeom prst="rect">
-            <a:avLst/>
-          </a:prstGeom>
-          <a:noFill/>
-          <a:ln w="12700" cap="flat">
-            <a:noFill/>
-            <a:miter lim="400000"/>
-          </a:ln>
-          <a:effectLst/>
-          <a:sp3d/>
-        </p:spPr>
-        <p:style>
-          <a:lnRef idx="0">
-            <a:scrgbClr r="0" g="0" b="0"/>
-          </a:lnRef>
-          <a:fillRef idx="0">
-            <a:scrgbClr r="0" g="0" b="0"/>
-          </a:fillRef>
-          <a:effectRef idx="0">
-            <a:scrgbClr r="0" g="0" b="0"/>
-          </a:effectRef>
-          <a:fontRef idx="none"/>
-        </p:style>
-        <p:txBody>
-          <a:bodyPr rot="0" spcFirstLastPara="1" vertOverflow="overflow" horzOverflow="overflow" vert="horz" wrap="none" lIns="45719" tIns="45719" rIns="45719" bIns="45719" numCol="1" spcCol="38100" rtlCol="0" anchor="t">
-            <a:spAutoFit/>
-          </a:bodyPr>
-          <a:lstStyle/>
-          <a:p>
-            <a:pPr marL="0" marR="0" indent="0" algn="l" defTabSz="914400" rtl="0" fontAlgn="auto" latinLnBrk="0" hangingPunct="0">
-              <a:lnSpc>
-                <a:spcPct val="100000"/>
-              </a:lnSpc>
-              <a:spcBef>
-                <a:spcPts val="0"/>
-              </a:spcBef>
-              <a:spcAft>
-                <a:spcPts val="0"/>
-              </a:spcAft>
-              <a:buClrTx/>
-              <a:buSzTx/>
-              <a:buFontTx/>
-              <a:buNone/>
-              <a:tabLst/>
-            </a:pPr>
-            <a:r>
-              <a:rPr lang="en-US" altLang="zh-CN" sz="4000" dirty="0">
-                <a:latin typeface="微软雅黑"/>
-                <a:ea typeface="微软雅黑"/>
-              </a:rPr>
-              <a:t>B</a:t>
-            </a:r>
-          </a:p>
-          <a:p>
-            <a:pPr marL="0" marR="0" indent="0" algn="l" defTabSz="914400" rtl="0" fontAlgn="auto" latinLnBrk="0" hangingPunct="0">
-              <a:lnSpc>
-                <a:spcPct val="100000"/>
-              </a:lnSpc>
-              <a:spcBef>
-                <a:spcPts val="0"/>
-              </a:spcBef>
-              <a:spcAft>
-                <a:spcPts val="0"/>
-              </a:spcAft>
-              <a:buClrTx/>
-              <a:buSzTx/>
-              <a:buFontTx/>
-              <a:buNone/>
-              <a:tabLst/>
-            </a:pPr>
-            <a:r>
-              <a:rPr lang="en-US" altLang="zh-CN" sz="4000" dirty="0">
-                <a:latin typeface="微软雅黑"/>
-                <a:ea typeface="微软雅黑"/>
-                <a:sym typeface="微软雅黑"/>
-              </a:rPr>
-              <a:t>E</a:t>
-            </a:r>
-          </a:p>
-          <a:p>
-            <a:pPr marL="0" marR="0" indent="0" algn="l" defTabSz="914400" rtl="0" fontAlgn="auto" latinLnBrk="0" hangingPunct="0">
-              <a:lnSpc>
-                <a:spcPct val="100000"/>
-              </a:lnSpc>
-              <a:spcBef>
-                <a:spcPts val="0"/>
-              </a:spcBef>
-              <a:spcAft>
-                <a:spcPts val="0"/>
-              </a:spcAft>
-              <a:buClrTx/>
-              <a:buSzTx/>
-              <a:buFontTx/>
-              <a:buNone/>
-              <a:tabLst/>
-            </a:pPr>
-            <a:r>
-              <a:rPr lang="en-US" altLang="zh-CN" sz="4000" dirty="0">
-                <a:latin typeface="微软雅黑"/>
-                <a:ea typeface="微软雅黑"/>
-              </a:rPr>
-              <a:t>R</a:t>
-            </a:r>
-          </a:p>
-          <a:p>
-            <a:pPr marL="0" marR="0" indent="0" algn="l" defTabSz="914400" rtl="0" fontAlgn="auto" latinLnBrk="0" hangingPunct="0">
-              <a:lnSpc>
-                <a:spcPct val="100000"/>
-              </a:lnSpc>
-              <a:spcBef>
-                <a:spcPts val="0"/>
-              </a:spcBef>
-              <a:spcAft>
-                <a:spcPts val="0"/>
-              </a:spcAft>
-              <a:buClrTx/>
-              <a:buSzTx/>
-              <a:buFontTx/>
-              <a:buNone/>
-              <a:tabLst/>
-            </a:pPr>
-            <a:r>
-              <a:rPr lang="en-US" altLang="zh-CN" sz="4000" dirty="0">
-                <a:latin typeface="微软雅黑"/>
-                <a:ea typeface="微软雅黑"/>
-                <a:sym typeface="微软雅黑"/>
-              </a:rPr>
-              <a:t>T</a:t>
-            </a:r>
-            <a:endParaRPr lang="zh-CN" altLang="en-US" sz="4000" dirty="0">
-              <a:latin typeface="微软雅黑"/>
-              <a:ea typeface="微软雅黑"/>
-            </a:endParaRPr>
-          </a:p>
-        </p:txBody>
-      </p:sp>
-      <p:sp>
-        <p:nvSpPr>
-          <p:cNvPr id="14" name="Rectangle: Rounded Corners 13">
-            <a:extLst>
-              <a:ext uri="{FF2B5EF4-FFF2-40B4-BE49-F238E27FC236}">
-                <a16:creationId xmlns:a16="http://schemas.microsoft.com/office/drawing/2014/main" id="{255A75E9-26F2-4572-A5CD-5A3CB6C885C8}"/>
-              </a:ext>
-            </a:extLst>
-          </p:cNvPr>
-          <p:cNvSpPr/>
-          <p:nvPr/>
-        </p:nvSpPr>
-        <p:spPr>
-          <a:xfrm>
-            <a:off x="4554876" y="1791092"/>
-            <a:ext cx="839046" cy="2809187"/>
-          </a:xfrm>
-          <a:prstGeom prst="roundRect">
-            <a:avLst/>
-          </a:prstGeom>
-          <a:solidFill>
-            <a:srgbClr val="33CCCC"/>
-          </a:solidFill>
-          <a:ln w="12700" cap="flat">
-            <a:solidFill>
-              <a:schemeClr val="accent1"/>
-            </a:solidFill>
-            <a:prstDash val="solid"/>
-            <a:miter lim="800000"/>
-          </a:ln>
-          <a:effectLst/>
-          <a:sp3d/>
-        </p:spPr>
-        <p:style>
-          <a:lnRef idx="0">
-            <a:scrgbClr r="0" g="0" b="0"/>
-          </a:lnRef>
-          <a:fillRef idx="0">
-            <a:scrgbClr r="0" g="0" b="0"/>
-          </a:fillRef>
-          <a:effectRef idx="0">
-            <a:scrgbClr r="0" g="0" b="0"/>
-          </a:effectRef>
-          <a:fontRef idx="none"/>
-        </p:style>
-        <p:txBody>
-          <a:bodyPr rot="0" spcFirstLastPara="1" vertOverflow="overflow" horzOverflow="overflow" vert="horz" wrap="square" lIns="45719" tIns="45719" rIns="45719" bIns="45719" numCol="1" spcCol="38100" rtlCol="0" anchor="ctr">
-            <a:spAutoFit/>
-          </a:bodyPr>
-          <a:lstStyle/>
-          <a:p>
-            <a:pPr marL="0" marR="0" indent="0" algn="l" defTabSz="914400" rtl="0" fontAlgn="auto" latinLnBrk="0" hangingPunct="0">
-              <a:lnSpc>
-                <a:spcPct val="100000"/>
-              </a:lnSpc>
-              <a:spcBef>
-                <a:spcPts val="0"/>
-              </a:spcBef>
-              <a:spcAft>
-                <a:spcPts val="0"/>
-              </a:spcAft>
-              <a:buClrTx/>
-              <a:buSzTx/>
-              <a:buFontTx/>
-              <a:buNone/>
-              <a:tabLst/>
-            </a:pPr>
-            <a:endParaRPr kumimoji="0" lang="zh-CN" altLang="en-US" sz="1800" b="0" i="0" u="none" strike="noStrike" cap="none" spc="0" normalizeH="0" baseline="0" dirty="0">
-              <a:ln>
-                <a:noFill/>
-              </a:ln>
-              <a:solidFill>
-                <a:srgbClr val="000000"/>
-              </a:solidFill>
-              <a:effectLst/>
-              <a:uFillTx/>
-              <a:latin typeface="+mj-lt"/>
-              <a:ea typeface="+mj-ea"/>
-              <a:cs typeface="+mj-cs"/>
-              <a:sym typeface="等线"/>
-            </a:endParaRPr>
-          </a:p>
-        </p:txBody>
-      </p:sp>
-      <p:sp>
-        <p:nvSpPr>
-          <p:cNvPr id="15" name="TextBox 14">
-            <a:extLst>
-              <a:ext uri="{FF2B5EF4-FFF2-40B4-BE49-F238E27FC236}">
-                <a16:creationId xmlns:a16="http://schemas.microsoft.com/office/drawing/2014/main" id="{7D7815F3-CC6F-4991-A7CA-08D9E1C34176}"/>
-              </a:ext>
-            </a:extLst>
-          </p:cNvPr>
-          <p:cNvSpPr txBox="1"/>
-          <p:nvPr/>
-        </p:nvSpPr>
-        <p:spPr>
-          <a:xfrm>
-            <a:off x="4745579" y="2164634"/>
-            <a:ext cx="453007" cy="2062101"/>
-          </a:xfrm>
-          <a:prstGeom prst="rect">
-            <a:avLst/>
-          </a:prstGeom>
-          <a:noFill/>
-          <a:ln w="12700" cap="flat">
-            <a:noFill/>
-            <a:miter lim="400000"/>
-          </a:ln>
-          <a:effectLst/>
-          <a:sp3d/>
-        </p:spPr>
-        <p:style>
-          <a:lnRef idx="0">
-            <a:scrgbClr r="0" g="0" b="0"/>
-          </a:lnRef>
-          <a:fillRef idx="0">
-            <a:scrgbClr r="0" g="0" b="0"/>
-          </a:fillRef>
-          <a:effectRef idx="0">
-            <a:scrgbClr r="0" g="0" b="0"/>
-          </a:effectRef>
-          <a:fontRef idx="none"/>
-        </p:style>
-        <p:txBody>
-          <a:bodyPr rot="0" spcFirstLastPara="1" vertOverflow="overflow" horzOverflow="overflow" vert="horz" wrap="none" lIns="45719" tIns="45719" rIns="45719" bIns="45719" numCol="1" spcCol="38100" rtlCol="0" anchor="t">
-            <a:spAutoFit/>
-          </a:bodyPr>
-          <a:lstStyle/>
-          <a:p>
-            <a:pPr marL="0" marR="0" indent="0" algn="l" defTabSz="914400" rtl="0" fontAlgn="auto" latinLnBrk="0" hangingPunct="0">
-              <a:lnSpc>
-                <a:spcPct val="100000"/>
-              </a:lnSpc>
-              <a:spcBef>
-                <a:spcPts val="0"/>
-              </a:spcBef>
-              <a:spcAft>
-                <a:spcPts val="0"/>
-              </a:spcAft>
-              <a:buClrTx/>
-              <a:buSzTx/>
-              <a:buFontTx/>
-              <a:buNone/>
-              <a:tabLst/>
-            </a:pPr>
-            <a:r>
-              <a:rPr lang="en-US" altLang="zh-CN" sz="4000" dirty="0">
-                <a:latin typeface="微软雅黑"/>
-                <a:ea typeface="微软雅黑"/>
-              </a:rPr>
-              <a:t>V</a:t>
-            </a:r>
-          </a:p>
-          <a:p>
-            <a:pPr marL="0" marR="0" indent="0" algn="l" defTabSz="914400" rtl="0" fontAlgn="auto" latinLnBrk="0" hangingPunct="0">
-              <a:lnSpc>
-                <a:spcPct val="100000"/>
-              </a:lnSpc>
-              <a:spcBef>
-                <a:spcPts val="0"/>
-              </a:spcBef>
-              <a:spcAft>
-                <a:spcPts val="0"/>
-              </a:spcAft>
-              <a:buClrTx/>
-              <a:buSzTx/>
-              <a:buFontTx/>
-              <a:buNone/>
-              <a:tabLst/>
-            </a:pPr>
-            <a:r>
-              <a:rPr lang="en-US" altLang="zh-CN" sz="4000" dirty="0">
-                <a:latin typeface="微软雅黑"/>
-                <a:ea typeface="微软雅黑"/>
-              </a:rPr>
-              <a:t>A</a:t>
-            </a:r>
-          </a:p>
-          <a:p>
-            <a:pPr marL="0" marR="0" indent="0" algn="l" defTabSz="914400" rtl="0" fontAlgn="auto" latinLnBrk="0" hangingPunct="0">
-              <a:lnSpc>
-                <a:spcPct val="100000"/>
-              </a:lnSpc>
-              <a:spcBef>
-                <a:spcPts val="0"/>
-              </a:spcBef>
-              <a:spcAft>
-                <a:spcPts val="0"/>
-              </a:spcAft>
-              <a:buClrTx/>
-              <a:buSzTx/>
-              <a:buFontTx/>
-              <a:buNone/>
-              <a:tabLst/>
-            </a:pPr>
-            <a:r>
-              <a:rPr lang="en-US" altLang="zh-CN" sz="4800" dirty="0">
-                <a:latin typeface="微软雅黑"/>
-                <a:ea typeface="微软雅黑"/>
-              </a:rPr>
-              <a:t>E</a:t>
-            </a:r>
-            <a:endParaRPr lang="zh-CN" altLang="en-US" sz="4800" dirty="0">
-              <a:latin typeface="微软雅黑"/>
-              <a:ea typeface="微软雅黑"/>
-            </a:endParaRPr>
-          </a:p>
-        </p:txBody>
-      </p:sp>
-      <p:sp>
-        <p:nvSpPr>
-          <p:cNvPr id="18" name="Rectangle: Rounded Corners 17">
-            <a:extLst>
-              <a:ext uri="{FF2B5EF4-FFF2-40B4-BE49-F238E27FC236}">
-                <a16:creationId xmlns:a16="http://schemas.microsoft.com/office/drawing/2014/main" id="{65B48A98-8ABD-4965-A0E7-F8834536864C}"/>
-              </a:ext>
-            </a:extLst>
-          </p:cNvPr>
-          <p:cNvSpPr/>
-          <p:nvPr/>
-        </p:nvSpPr>
-        <p:spPr>
-          <a:xfrm>
-            <a:off x="7428962" y="3478482"/>
-            <a:ext cx="917536" cy="2392051"/>
-          </a:xfrm>
-          <a:prstGeom prst="roundRect">
-            <a:avLst/>
-          </a:prstGeom>
-          <a:solidFill>
-            <a:srgbClr val="FF9999"/>
-          </a:solidFill>
-          <a:ln w="12700" cap="flat">
-            <a:solidFill>
-              <a:schemeClr val="accent1"/>
-            </a:solidFill>
-            <a:prstDash val="solid"/>
-            <a:miter lim="800000"/>
-          </a:ln>
-          <a:effectLst/>
-          <a:sp3d/>
-        </p:spPr>
-        <p:style>
-          <a:lnRef idx="0">
-            <a:scrgbClr r="0" g="0" b="0"/>
-          </a:lnRef>
-          <a:fillRef idx="0">
-            <a:scrgbClr r="0" g="0" b="0"/>
-          </a:fillRef>
-          <a:effectRef idx="0">
-            <a:scrgbClr r="0" g="0" b="0"/>
-          </a:effectRef>
-          <a:fontRef idx="none"/>
-        </p:style>
-        <p:txBody>
-          <a:bodyPr rot="0" spcFirstLastPara="1" vertOverflow="overflow" horzOverflow="overflow" vert="horz" wrap="square" lIns="45719" tIns="45719" rIns="45719" bIns="45719" numCol="1" spcCol="38100" rtlCol="0" anchor="ctr">
-            <a:spAutoFit/>
-          </a:bodyPr>
-          <a:lstStyle/>
-          <a:p>
-            <a:pPr marL="0" marR="0" indent="0" algn="l" defTabSz="914400" rtl="0" fontAlgn="auto" latinLnBrk="0" hangingPunct="0">
-              <a:lnSpc>
-                <a:spcPct val="100000"/>
-              </a:lnSpc>
-              <a:spcBef>
-                <a:spcPts val="0"/>
-              </a:spcBef>
-              <a:spcAft>
-                <a:spcPts val="0"/>
-              </a:spcAft>
-              <a:buClrTx/>
-              <a:buSzTx/>
-              <a:buFontTx/>
-              <a:buNone/>
-              <a:tabLst/>
-            </a:pPr>
-            <a:endParaRPr kumimoji="0" lang="zh-CN" altLang="en-US" sz="1800" b="0" i="0" u="none" strike="noStrike" cap="none" spc="0" normalizeH="0" baseline="0" dirty="0">
-              <a:ln>
-                <a:noFill/>
-              </a:ln>
-              <a:solidFill>
-                <a:srgbClr val="000000"/>
-              </a:solidFill>
-              <a:effectLst/>
-              <a:uFillTx/>
-              <a:latin typeface="+mj-lt"/>
-              <a:ea typeface="+mj-ea"/>
-              <a:cs typeface="+mj-cs"/>
-              <a:sym typeface="等线"/>
-            </a:endParaRPr>
-          </a:p>
-        </p:txBody>
-      </p:sp>
-      <p:sp>
-        <p:nvSpPr>
-          <p:cNvPr id="19" name="TextBox 18">
-            <a:extLst>
-              <a:ext uri="{FF2B5EF4-FFF2-40B4-BE49-F238E27FC236}">
-                <a16:creationId xmlns:a16="http://schemas.microsoft.com/office/drawing/2014/main" id="{57DE0889-FA00-40EC-846A-492B9747AA45}"/>
-              </a:ext>
-            </a:extLst>
-          </p:cNvPr>
-          <p:cNvSpPr txBox="1"/>
-          <p:nvPr/>
-        </p:nvSpPr>
-        <p:spPr>
-          <a:xfrm>
-            <a:off x="7692009" y="3614902"/>
-            <a:ext cx="425756" cy="2246767"/>
-          </a:xfrm>
-          <a:prstGeom prst="rect">
-            <a:avLst/>
-          </a:prstGeom>
-          <a:noFill/>
-          <a:ln w="12700" cap="flat">
-            <a:noFill/>
-            <a:miter lim="400000"/>
-          </a:ln>
-          <a:effectLst/>
-          <a:sp3d/>
-        </p:spPr>
-        <p:style>
-          <a:lnRef idx="0">
-            <a:scrgbClr r="0" g="0" b="0"/>
-          </a:lnRef>
-          <a:fillRef idx="0">
-            <a:scrgbClr r="0" g="0" b="0"/>
-          </a:fillRef>
-          <a:effectRef idx="0">
-            <a:scrgbClr r="0" g="0" b="0"/>
-          </a:effectRef>
-          <a:fontRef idx="none"/>
-        </p:style>
-        <p:txBody>
-          <a:bodyPr rot="0" spcFirstLastPara="1" vertOverflow="overflow" horzOverflow="overflow" vert="horz" wrap="none" lIns="45719" tIns="45719" rIns="45719" bIns="45719" numCol="1" spcCol="38100" rtlCol="0" anchor="t">
-            <a:spAutoFit/>
-          </a:bodyPr>
-          <a:lstStyle/>
-          <a:p>
-            <a:pPr marL="0" marR="0" indent="0" algn="l" defTabSz="914400" rtl="0" fontAlgn="auto" latinLnBrk="0" hangingPunct="0">
-              <a:lnSpc>
-                <a:spcPct val="100000"/>
-              </a:lnSpc>
-              <a:spcBef>
-                <a:spcPts val="0"/>
-              </a:spcBef>
-              <a:spcAft>
-                <a:spcPts val="0"/>
-              </a:spcAft>
-              <a:buClrTx/>
-              <a:buSzTx/>
-              <a:buFontTx/>
-              <a:buNone/>
-              <a:tabLst/>
-            </a:pPr>
-            <a:r>
-              <a:rPr lang="en-US" altLang="zh-CN" sz="4000" dirty="0">
-                <a:latin typeface="微软雅黑"/>
-                <a:ea typeface="微软雅黑"/>
-              </a:rPr>
-              <a:t>F</a:t>
-            </a:r>
-          </a:p>
-          <a:p>
-            <a:pPr marL="0" marR="0" indent="0" algn="l" defTabSz="914400" rtl="0" fontAlgn="auto" latinLnBrk="0" hangingPunct="0">
-              <a:lnSpc>
-                <a:spcPct val="100000"/>
-              </a:lnSpc>
-              <a:spcBef>
-                <a:spcPts val="0"/>
-              </a:spcBef>
-              <a:spcAft>
-                <a:spcPts val="0"/>
-              </a:spcAft>
-              <a:buClrTx/>
-              <a:buSzTx/>
-              <a:buFontTx/>
-              <a:buNone/>
-              <a:tabLst/>
-            </a:pPr>
-            <a:r>
-              <a:rPr lang="en-US" altLang="zh-CN" sz="3600" dirty="0">
-                <a:latin typeface="微软雅黑"/>
-                <a:ea typeface="微软雅黑"/>
-              </a:rPr>
-              <a:t>C</a:t>
-            </a:r>
-          </a:p>
-          <a:p>
-            <a:pPr marL="0" marR="0" indent="0" algn="l" defTabSz="914400" rtl="0" fontAlgn="auto" latinLnBrk="0" hangingPunct="0">
-              <a:lnSpc>
-                <a:spcPct val="100000"/>
-              </a:lnSpc>
-              <a:spcBef>
-                <a:spcPts val="0"/>
-              </a:spcBef>
-              <a:spcAft>
-                <a:spcPts val="0"/>
-              </a:spcAft>
-              <a:buClrTx/>
-              <a:buSzTx/>
-              <a:buFontTx/>
-              <a:buNone/>
-              <a:tabLst/>
-            </a:pPr>
-            <a:r>
-              <a:rPr lang="en-US" altLang="zh-CN" sz="3200" dirty="0">
-                <a:latin typeface="微软雅黑"/>
-                <a:ea typeface="微软雅黑"/>
-              </a:rPr>
-              <a:t>N</a:t>
-            </a:r>
-          </a:p>
-          <a:p>
-            <a:pPr marL="0" marR="0" indent="0" algn="l" defTabSz="914400" rtl="0" fontAlgn="auto" latinLnBrk="0" hangingPunct="0">
-              <a:lnSpc>
-                <a:spcPct val="100000"/>
-              </a:lnSpc>
-              <a:spcBef>
-                <a:spcPts val="0"/>
-              </a:spcBef>
-              <a:spcAft>
-                <a:spcPts val="0"/>
-              </a:spcAft>
-              <a:buClrTx/>
-              <a:buSzTx/>
-              <a:buFontTx/>
-              <a:buNone/>
-              <a:tabLst/>
-            </a:pPr>
-            <a:r>
-              <a:rPr lang="en-US" altLang="zh-CN" sz="3200" dirty="0">
-                <a:latin typeface="微软雅黑"/>
-                <a:ea typeface="微软雅黑"/>
-              </a:rPr>
-              <a:t>N</a:t>
-            </a:r>
-          </a:p>
-        </p:txBody>
-      </p:sp>
-      <p:sp>
-        <p:nvSpPr>
-          <p:cNvPr id="24" name="Arrow: Right 23">
-            <a:extLst>
-              <a:ext uri="{FF2B5EF4-FFF2-40B4-BE49-F238E27FC236}">
-                <a16:creationId xmlns:a16="http://schemas.microsoft.com/office/drawing/2014/main" id="{59C38776-7CA0-4F6A-9D38-D5ACA2261F6E}"/>
-              </a:ext>
-            </a:extLst>
-          </p:cNvPr>
-          <p:cNvSpPr/>
-          <p:nvPr/>
-        </p:nvSpPr>
-        <p:spPr>
-          <a:xfrm>
-            <a:off x="2962850" y="2829219"/>
-            <a:ext cx="1244327" cy="732934"/>
+            <a:off x="6107587" y="4226735"/>
+            <a:ext cx="971545" cy="524374"/>
           </a:xfrm>
           <a:prstGeom prst="rightArrow">
             <a:avLst/>
           </a:prstGeom>
-          <a:solidFill>
-            <a:srgbClr val="CCFF66"/>
-          </a:solidFill>
-          <a:ln w="12700" cap="flat">
-            <a:solidFill>
-              <a:schemeClr val="accent1"/>
-            </a:solidFill>
-            <a:prstDash val="solid"/>
-            <a:miter lim="800000"/>
-          </a:ln>
-          <a:effectLst/>
-          <a:sp3d/>
+          <a:ln/>
         </p:spPr>
         <p:style>
-          <a:lnRef idx="0">
-            <a:scrgbClr r="0" g="0" b="0"/>
+          <a:lnRef idx="2">
+            <a:schemeClr val="accent4"/>
           </a:lnRef>
-          <a:fillRef idx="0">
-            <a:scrgbClr r="0" g="0" b="0"/>
+          <a:fillRef idx="1">
+            <a:schemeClr val="lt1"/>
           </a:fillRef>
           <a:effectRef idx="0">
-            <a:scrgbClr r="0" g="0" b="0"/>
+            <a:schemeClr val="accent4"/>
           </a:effectRef>
-          <a:fontRef idx="none"/>
+          <a:fontRef idx="minor">
+            <a:schemeClr val="dk1"/>
+          </a:fontRef>
         </p:style>
         <p:txBody>
           <a:bodyPr rot="0" spcFirstLastPara="1" vertOverflow="overflow" horzOverflow="overflow" vert="horz" wrap="square" lIns="45719" tIns="45719" rIns="45719" bIns="45719" numCol="1" spcCol="38100" rtlCol="0" anchor="ctr">
@@ -17413,10 +16692,10 @@
       </p:sp>
       <p:sp>
         <p:nvSpPr>
-          <p:cNvPr id="25" name="Rectangle: Rounded Corners 24">
+          <p:cNvPr id="29" name="Arrow: Right 28">
             <a:extLst>
               <a:ext uri="{FF2B5EF4-FFF2-40B4-BE49-F238E27FC236}">
-                <a16:creationId xmlns:a16="http://schemas.microsoft.com/office/drawing/2014/main" id="{BE0A5A6B-2006-4A62-8217-9D66D3398C74}"/>
+                <a16:creationId xmlns:a16="http://schemas.microsoft.com/office/drawing/2014/main" id="{3050FE76-C89E-4D46-ADFE-DFC812FEA693}"/>
               </a:ext>
             </a:extLst>
           </p:cNvPr>
@@ -17425,267 +16704,27 @@
         </p:nvSpPr>
         <p:spPr>
           <a:xfrm>
-            <a:off x="7428962" y="652463"/>
-            <a:ext cx="875857" cy="2392051"/>
-          </a:xfrm>
-          <a:prstGeom prst="roundRect">
-            <a:avLst/>
-          </a:prstGeom>
-          <a:solidFill>
-            <a:srgbClr val="FF9999"/>
-          </a:solidFill>
-          <a:ln w="12700" cap="flat">
-            <a:solidFill>
-              <a:schemeClr val="accent1"/>
-            </a:solidFill>
-            <a:prstDash val="solid"/>
-            <a:miter lim="800000"/>
-          </a:ln>
-          <a:effectLst/>
-          <a:sp3d/>
-        </p:spPr>
-        <p:style>
-          <a:lnRef idx="0">
-            <a:scrgbClr r="0" g="0" b="0"/>
-          </a:lnRef>
-          <a:fillRef idx="0">
-            <a:scrgbClr r="0" g="0" b="0"/>
-          </a:fillRef>
-          <a:effectRef idx="0">
-            <a:scrgbClr r="0" g="0" b="0"/>
-          </a:effectRef>
-          <a:fontRef idx="none"/>
-        </p:style>
-        <p:txBody>
-          <a:bodyPr rot="0" spcFirstLastPara="1" vertOverflow="overflow" horzOverflow="overflow" vert="horz" wrap="square" lIns="45719" tIns="45719" rIns="45719" bIns="45719" numCol="1" spcCol="38100" rtlCol="0" anchor="ctr">
-            <a:spAutoFit/>
-          </a:bodyPr>
-          <a:lstStyle/>
-          <a:p>
-            <a:pPr marL="0" marR="0" indent="0" algn="l" defTabSz="914400" rtl="0" fontAlgn="auto" latinLnBrk="0" hangingPunct="0">
-              <a:lnSpc>
-                <a:spcPct val="100000"/>
-              </a:lnSpc>
-              <a:spcBef>
-                <a:spcPts val="0"/>
-              </a:spcBef>
-              <a:spcAft>
-                <a:spcPts val="0"/>
-              </a:spcAft>
-              <a:buClrTx/>
-              <a:buSzTx/>
-              <a:buFontTx/>
-              <a:buNone/>
-              <a:tabLst/>
-            </a:pPr>
-            <a:endParaRPr kumimoji="0" lang="zh-CN" altLang="en-US" sz="1800" b="0" i="0" u="none" strike="noStrike" cap="none" spc="0" normalizeH="0" baseline="0" dirty="0">
-              <a:ln>
-                <a:noFill/>
-              </a:ln>
-              <a:solidFill>
-                <a:srgbClr val="000000"/>
-              </a:solidFill>
-              <a:effectLst/>
-              <a:uFillTx/>
-              <a:latin typeface="+mj-lt"/>
-              <a:ea typeface="+mj-ea"/>
-              <a:cs typeface="+mj-cs"/>
-              <a:sym typeface="等线"/>
-            </a:endParaRPr>
-          </a:p>
-        </p:txBody>
-      </p:sp>
-      <p:sp>
-        <p:nvSpPr>
-          <p:cNvPr id="26" name="TextBox 25">
-            <a:extLst>
-              <a:ext uri="{FF2B5EF4-FFF2-40B4-BE49-F238E27FC236}">
-                <a16:creationId xmlns:a16="http://schemas.microsoft.com/office/drawing/2014/main" id="{44E42A0C-8E1A-4E53-90B8-679EF82E0190}"/>
-              </a:ext>
-            </a:extLst>
-          </p:cNvPr>
-          <p:cNvSpPr txBox="1"/>
-          <p:nvPr/>
-        </p:nvSpPr>
-        <p:spPr>
-          <a:xfrm>
-            <a:off x="7674852" y="801837"/>
-            <a:ext cx="384077" cy="2185212"/>
-          </a:xfrm>
-          <a:prstGeom prst="rect">
-            <a:avLst/>
-          </a:prstGeom>
-          <a:noFill/>
-          <a:ln w="12700" cap="flat">
-            <a:noFill/>
-            <a:miter lim="400000"/>
-          </a:ln>
-          <a:effectLst/>
-          <a:sp3d/>
-        </p:spPr>
-        <p:style>
-          <a:lnRef idx="0">
-            <a:scrgbClr r="0" g="0" b="0"/>
-          </a:lnRef>
-          <a:fillRef idx="0">
-            <a:scrgbClr r="0" g="0" b="0"/>
-          </a:fillRef>
-          <a:effectRef idx="0">
-            <a:scrgbClr r="0" g="0" b="0"/>
-          </a:effectRef>
-          <a:fontRef idx="none"/>
-        </p:style>
-        <p:txBody>
-          <a:bodyPr rot="0" spcFirstLastPara="1" vertOverflow="overflow" horzOverflow="overflow" vert="horz" wrap="none" lIns="45719" tIns="45719" rIns="45719" bIns="45719" numCol="1" spcCol="38100" rtlCol="0" anchor="t">
-            <a:spAutoFit/>
-          </a:bodyPr>
-          <a:lstStyle/>
-          <a:p>
-            <a:pPr marL="0" marR="0" indent="0" algn="l" defTabSz="914400" rtl="0" fontAlgn="auto" latinLnBrk="0" hangingPunct="0">
-              <a:lnSpc>
-                <a:spcPct val="100000"/>
-              </a:lnSpc>
-              <a:spcBef>
-                <a:spcPts val="0"/>
-              </a:spcBef>
-              <a:spcAft>
-                <a:spcPts val="0"/>
-              </a:spcAft>
-              <a:buClrTx/>
-              <a:buSzTx/>
-              <a:buFontTx/>
-              <a:buNone/>
-              <a:tabLst/>
-            </a:pPr>
-            <a:r>
-              <a:rPr lang="en-US" altLang="zh-CN" sz="3600" dirty="0">
-                <a:latin typeface="微软雅黑"/>
-                <a:ea typeface="微软雅黑"/>
-              </a:rPr>
-              <a:t>T</a:t>
-            </a:r>
-          </a:p>
-          <a:p>
-            <a:pPr marL="0" marR="0" indent="0" algn="l" defTabSz="914400" rtl="0" fontAlgn="auto" latinLnBrk="0" hangingPunct="0">
-              <a:lnSpc>
-                <a:spcPct val="100000"/>
-              </a:lnSpc>
-              <a:spcBef>
-                <a:spcPts val="0"/>
-              </a:spcBef>
-              <a:spcAft>
-                <a:spcPts val="0"/>
-              </a:spcAft>
-              <a:buClrTx/>
-              <a:buSzTx/>
-              <a:buFontTx/>
-              <a:buNone/>
-              <a:tabLst/>
-            </a:pPr>
-            <a:r>
-              <a:rPr lang="en-US" altLang="zh-CN" sz="3600" dirty="0">
-                <a:latin typeface="微软雅黑"/>
-                <a:ea typeface="微软雅黑"/>
-              </a:rPr>
-              <a:t>S</a:t>
-            </a:r>
-          </a:p>
-          <a:p>
-            <a:pPr marL="0" marR="0" indent="0" algn="l" defTabSz="914400" rtl="0" fontAlgn="auto" latinLnBrk="0" hangingPunct="0">
-              <a:lnSpc>
-                <a:spcPct val="100000"/>
-              </a:lnSpc>
-              <a:spcBef>
-                <a:spcPts val="0"/>
-              </a:spcBef>
-              <a:spcAft>
-                <a:spcPts val="0"/>
-              </a:spcAft>
-              <a:buClrTx/>
-              <a:buSzTx/>
-              <a:buFontTx/>
-              <a:buNone/>
-              <a:tabLst/>
-            </a:pPr>
-            <a:r>
-              <a:rPr lang="en-US" altLang="zh-CN" sz="2800" dirty="0">
-                <a:latin typeface="微软雅黑"/>
-                <a:ea typeface="微软雅黑"/>
-              </a:rPr>
-              <a:t>N</a:t>
-            </a:r>
-          </a:p>
-          <a:p>
-            <a:pPr marL="0" marR="0" indent="0" algn="l" defTabSz="914400" rtl="0" fontAlgn="auto" latinLnBrk="0" hangingPunct="0">
-              <a:lnSpc>
-                <a:spcPct val="100000"/>
-              </a:lnSpc>
-              <a:spcBef>
-                <a:spcPts val="0"/>
-              </a:spcBef>
-              <a:spcAft>
-                <a:spcPts val="0"/>
-              </a:spcAft>
-              <a:buClrTx/>
-              <a:buSzTx/>
-              <a:buFontTx/>
-              <a:buNone/>
-              <a:tabLst/>
-            </a:pPr>
-            <a:r>
-              <a:rPr lang="en-US" altLang="zh-CN" sz="3600" dirty="0">
-                <a:latin typeface="微软雅黑"/>
-                <a:ea typeface="微软雅黑"/>
-              </a:rPr>
-              <a:t>E</a:t>
-            </a:r>
-          </a:p>
-        </p:txBody>
-      </p:sp>
-      <p:sp>
-        <p:nvSpPr>
-          <p:cNvPr id="28" name="Arrow: Right 27">
-            <a:extLst>
-              <a:ext uri="{FF2B5EF4-FFF2-40B4-BE49-F238E27FC236}">
-                <a16:creationId xmlns:a16="http://schemas.microsoft.com/office/drawing/2014/main" id="{F1977F6F-C8C9-4D1E-9066-4D9E73F99A17}"/>
-              </a:ext>
-            </a:extLst>
-          </p:cNvPr>
-          <p:cNvSpPr/>
-          <p:nvPr/>
-        </p:nvSpPr>
-        <p:spPr>
-          <a:xfrm>
-            <a:off x="5872763" y="4226735"/>
-            <a:ext cx="1244327" cy="732934"/>
+            <a:off x="6044902" y="1507490"/>
+            <a:ext cx="971545" cy="524374"/>
           </a:xfrm>
           <a:prstGeom prst="rightArrow">
             <a:avLst/>
           </a:prstGeom>
-          <a:solidFill>
-            <a:srgbClr val="CCFF66"/>
-          </a:solidFill>
-          <a:ln w="12700" cap="flat">
-            <a:solidFill>
-              <a:schemeClr val="accent1"/>
-            </a:solidFill>
-            <a:prstDash val="solid"/>
-            <a:miter lim="800000"/>
-          </a:ln>
-          <a:effectLst/>
-          <a:sp3d/>
+          <a:ln/>
         </p:spPr>
         <p:style>
-          <a:lnRef idx="0">
-            <a:scrgbClr r="0" g="0" b="0"/>
+          <a:lnRef idx="2">
+            <a:schemeClr val="accent4"/>
           </a:lnRef>
-          <a:fillRef idx="0">
-            <a:scrgbClr r="0" g="0" b="0"/>
+          <a:fillRef idx="1">
+            <a:schemeClr val="lt1"/>
           </a:fillRef>
           <a:effectRef idx="0">
-            <a:scrgbClr r="0" g="0" b="0"/>
+            <a:schemeClr val="accent4"/>
           </a:effectRef>
-          <a:fontRef idx="none"/>
+          <a:fontRef idx="minor">
+            <a:schemeClr val="dk1"/>
+          </a:fontRef>
         </p:style>
         <p:txBody>
           <a:bodyPr rot="0" spcFirstLastPara="1" vertOverflow="overflow" horzOverflow="overflow" vert="horz" wrap="square" lIns="45719" tIns="45719" rIns="45719" bIns="45719" numCol="1" spcCol="38100" rtlCol="0" anchor="ctr">
@@ -17728,10 +16767,10 @@
       </p:sp>
       <p:sp>
         <p:nvSpPr>
-          <p:cNvPr id="29" name="Arrow: Right 28">
+          <p:cNvPr id="30" name="Arrow: Right 29">
             <a:extLst>
               <a:ext uri="{FF2B5EF4-FFF2-40B4-BE49-F238E27FC236}">
-                <a16:creationId xmlns:a16="http://schemas.microsoft.com/office/drawing/2014/main" id="{3050FE76-C89E-4D46-ADFE-DFC812FEA693}"/>
+                <a16:creationId xmlns:a16="http://schemas.microsoft.com/office/drawing/2014/main" id="{21F301ED-1DA2-49C3-A46D-CC4CC827C156}"/>
               </a:ext>
             </a:extLst>
           </p:cNvPr>
@@ -17740,36 +16779,27 @@
         </p:nvSpPr>
         <p:spPr>
           <a:xfrm>
-            <a:off x="5858935" y="1507490"/>
-            <a:ext cx="1244327" cy="732934"/>
+            <a:off x="8793272" y="4226735"/>
+            <a:ext cx="971545" cy="524374"/>
           </a:xfrm>
           <a:prstGeom prst="rightArrow">
             <a:avLst/>
           </a:prstGeom>
-          <a:solidFill>
-            <a:srgbClr val="CCFF66"/>
-          </a:solidFill>
-          <a:ln w="12700" cap="flat">
-            <a:solidFill>
-              <a:schemeClr val="accent1"/>
-            </a:solidFill>
-            <a:prstDash val="solid"/>
-            <a:miter lim="800000"/>
-          </a:ln>
-          <a:effectLst/>
-          <a:sp3d/>
+          <a:ln/>
         </p:spPr>
         <p:style>
-          <a:lnRef idx="0">
-            <a:scrgbClr r="0" g="0" b="0"/>
+          <a:lnRef idx="2">
+            <a:schemeClr val="accent4"/>
           </a:lnRef>
-          <a:fillRef idx="0">
-            <a:scrgbClr r="0" g="0" b="0"/>
+          <a:fillRef idx="1">
+            <a:schemeClr val="lt1"/>
           </a:fillRef>
           <a:effectRef idx="0">
-            <a:scrgbClr r="0" g="0" b="0"/>
+            <a:schemeClr val="accent4"/>
           </a:effectRef>
-          <a:fontRef idx="none"/>
+          <a:fontRef idx="minor">
+            <a:schemeClr val="dk1"/>
+          </a:fontRef>
         </p:style>
         <p:txBody>
           <a:bodyPr rot="0" spcFirstLastPara="1" vertOverflow="overflow" horzOverflow="overflow" vert="horz" wrap="square" lIns="45719" tIns="45719" rIns="45719" bIns="45719" numCol="1" spcCol="38100" rtlCol="0" anchor="ctr">
@@ -17812,90 +16842,6 @@
       </p:sp>
       <p:sp>
         <p:nvSpPr>
-          <p:cNvPr id="30" name="Arrow: Right 29">
-            <a:extLst>
-              <a:ext uri="{FF2B5EF4-FFF2-40B4-BE49-F238E27FC236}">
-                <a16:creationId xmlns:a16="http://schemas.microsoft.com/office/drawing/2014/main" id="{21F301ED-1DA2-49C3-A46D-CC4CC827C156}"/>
-              </a:ext>
-            </a:extLst>
-          </p:cNvPr>
-          <p:cNvSpPr/>
-          <p:nvPr/>
-        </p:nvSpPr>
-        <p:spPr>
-          <a:xfrm>
-            <a:off x="8664062" y="4226735"/>
-            <a:ext cx="1244327" cy="732934"/>
-          </a:xfrm>
-          <a:prstGeom prst="rightArrow">
-            <a:avLst/>
-          </a:prstGeom>
-          <a:solidFill>
-            <a:srgbClr val="CCFF66"/>
-          </a:solidFill>
-          <a:ln w="12700" cap="flat">
-            <a:solidFill>
-              <a:schemeClr val="accent1"/>
-            </a:solidFill>
-            <a:prstDash val="solid"/>
-            <a:miter lim="800000"/>
-          </a:ln>
-          <a:effectLst/>
-          <a:sp3d/>
-        </p:spPr>
-        <p:style>
-          <a:lnRef idx="0">
-            <a:scrgbClr r="0" g="0" b="0"/>
-          </a:lnRef>
-          <a:fillRef idx="0">
-            <a:scrgbClr r="0" g="0" b="0"/>
-          </a:fillRef>
-          <a:effectRef idx="0">
-            <a:scrgbClr r="0" g="0" b="0"/>
-          </a:effectRef>
-          <a:fontRef idx="none"/>
-        </p:style>
-        <p:txBody>
-          <a:bodyPr rot="0" spcFirstLastPara="1" vertOverflow="overflow" horzOverflow="overflow" vert="horz" wrap="square" lIns="45719" tIns="45719" rIns="45719" bIns="45719" numCol="1" spcCol="38100" rtlCol="0" anchor="ctr">
-            <a:spAutoFit/>
-          </a:bodyPr>
-          <a:lstStyle/>
-          <a:p>
-            <a:pPr marL="0" marR="0" indent="0" algn="l" defTabSz="914400" rtl="0" fontAlgn="auto" latinLnBrk="0" hangingPunct="0">
-              <a:lnSpc>
-                <a:spcPct val="100000"/>
-              </a:lnSpc>
-              <a:spcBef>
-                <a:spcPts val="0"/>
-              </a:spcBef>
-              <a:spcAft>
-                <a:spcPts val="0"/>
-              </a:spcAft>
-              <a:buClrTx/>
-              <a:buSzTx/>
-              <a:buFontTx/>
-              <a:buNone/>
-              <a:tabLst/>
-            </a:pPr>
-            <a:endParaRPr kumimoji="0" lang="zh-CN" altLang="en-US" sz="1800" b="0" i="0" u="none" strike="noStrike" cap="none" spc="0" normalizeH="0" baseline="0">
-              <a:ln>
-                <a:noFill/>
-              </a:ln>
-              <a:solidFill>
-                <a:srgbClr val="000000"/>
-              </a:solidFill>
-              <a:effectLst/>
-              <a:uFillTx/>
-              <a:latin typeface="+mj-lt"/>
-              <a:ea typeface="+mj-ea"/>
-              <a:cs typeface="+mj-cs"/>
-              <a:sym typeface="等线"/>
-            </a:endParaRPr>
-          </a:p>
-        </p:txBody>
-      </p:sp>
-      <p:sp>
-        <p:nvSpPr>
           <p:cNvPr id="31" name="Arrow: Right 30">
             <a:extLst>
               <a:ext uri="{FF2B5EF4-FFF2-40B4-BE49-F238E27FC236}">
@@ -17908,36 +16854,27 @@
         </p:nvSpPr>
         <p:spPr>
           <a:xfrm>
-            <a:off x="8592388" y="1482021"/>
-            <a:ext cx="1244327" cy="732934"/>
+            <a:off x="8721598" y="1482021"/>
+            <a:ext cx="971545" cy="524374"/>
           </a:xfrm>
           <a:prstGeom prst="rightArrow">
             <a:avLst/>
           </a:prstGeom>
-          <a:solidFill>
-            <a:srgbClr val="CCFF66"/>
-          </a:solidFill>
-          <a:ln w="12700" cap="flat">
-            <a:solidFill>
-              <a:schemeClr val="accent1"/>
-            </a:solidFill>
-            <a:prstDash val="solid"/>
-            <a:miter lim="800000"/>
-          </a:ln>
-          <a:effectLst/>
-          <a:sp3d/>
+          <a:ln/>
         </p:spPr>
         <p:style>
-          <a:lnRef idx="0">
-            <a:scrgbClr r="0" g="0" b="0"/>
+          <a:lnRef idx="2">
+            <a:schemeClr val="accent4"/>
           </a:lnRef>
-          <a:fillRef idx="0">
-            <a:scrgbClr r="0" g="0" b="0"/>
+          <a:fillRef idx="1">
+            <a:schemeClr val="lt1"/>
           </a:fillRef>
           <a:effectRef idx="0">
-            <a:scrgbClr r="0" g="0" b="0"/>
+            <a:schemeClr val="accent4"/>
           </a:effectRef>
-          <a:fontRef idx="none"/>
+          <a:fontRef idx="minor">
+            <a:schemeClr val="dk1"/>
+          </a:fontRef>
         </p:style>
         <p:txBody>
           <a:bodyPr rot="0" spcFirstLastPara="1" vertOverflow="overflow" horzOverflow="overflow" vert="horz" wrap="square" lIns="45719" tIns="45719" rIns="45719" bIns="45719" numCol="1" spcCol="38100" rtlCol="0" anchor="ctr">
@@ -18088,7 +17025,7 @@
         </p:nvSpPr>
         <p:spPr>
           <a:xfrm>
-            <a:off x="65030" y="2148188"/>
+            <a:off x="-28790" y="2139660"/>
             <a:ext cx="1340907" cy="646331"/>
           </a:xfrm>
           <a:prstGeom prst="rect">
@@ -18136,10 +17073,10 @@
       </p:sp>
       <p:sp>
         <p:nvSpPr>
-          <p:cNvPr id="36" name="文本框 10">
+          <p:cNvPr id="37" name="文本框 10">
             <a:extLst>
               <a:ext uri="{FF2B5EF4-FFF2-40B4-BE49-F238E27FC236}">
-                <a16:creationId xmlns:a16="http://schemas.microsoft.com/office/drawing/2014/main" id="{BC7D54D8-7FF7-46C9-95B3-09674449007D}"/>
+                <a16:creationId xmlns:a16="http://schemas.microsoft.com/office/drawing/2014/main" id="{D51B0F46-AA2A-4F73-B6FA-81CA730A52B5}"/>
               </a:ext>
             </a:extLst>
           </p:cNvPr>
@@ -18148,7 +17085,7 @@
         </p:nvSpPr>
         <p:spPr>
           <a:xfrm>
-            <a:off x="2670139" y="2184772"/>
+            <a:off x="5542176" y="861159"/>
             <a:ext cx="1709341" cy="646331"/>
           </a:xfrm>
           <a:prstGeom prst="rect">
@@ -18181,7 +17118,7 @@
             <a:pPr algn="ctr"/>
             <a:r>
               <a:rPr lang="en-US" sz="1800" dirty="0"/>
-              <a:t>1024-D</a:t>
+              <a:t>40-D</a:t>
             </a:r>
           </a:p>
           <a:p>
@@ -18196,10 +17133,10 @@
       </p:sp>
       <p:sp>
         <p:nvSpPr>
-          <p:cNvPr id="37" name="文本框 10">
+          <p:cNvPr id="38" name="文本框 10">
             <a:extLst>
               <a:ext uri="{FF2B5EF4-FFF2-40B4-BE49-F238E27FC236}">
-                <a16:creationId xmlns:a16="http://schemas.microsoft.com/office/drawing/2014/main" id="{D51B0F46-AA2A-4F73-B6FA-81CA730A52B5}"/>
+                <a16:creationId xmlns:a16="http://schemas.microsoft.com/office/drawing/2014/main" id="{FC1CE63D-31F0-4DD8-9313-480C325AB689}"/>
               </a:ext>
             </a:extLst>
           </p:cNvPr>
@@ -18208,7 +17145,7 @@
         </p:nvSpPr>
         <p:spPr>
           <a:xfrm>
-            <a:off x="5542176" y="861159"/>
+            <a:off x="5545488" y="3580404"/>
             <a:ext cx="1709341" cy="646331"/>
           </a:xfrm>
           <a:prstGeom prst="rect">
@@ -18256,10 +17193,10 @@
       </p:sp>
       <p:sp>
         <p:nvSpPr>
-          <p:cNvPr id="38" name="文本框 10">
+          <p:cNvPr id="39" name="文本框 10">
             <a:extLst>
               <a:ext uri="{FF2B5EF4-FFF2-40B4-BE49-F238E27FC236}">
-                <a16:creationId xmlns:a16="http://schemas.microsoft.com/office/drawing/2014/main" id="{FC1CE63D-31F0-4DD8-9313-480C325AB689}"/>
+                <a16:creationId xmlns:a16="http://schemas.microsoft.com/office/drawing/2014/main" id="{A83406F5-ADC2-40E6-A751-5281C8F1C0F7}"/>
               </a:ext>
             </a:extLst>
           </p:cNvPr>
@@ -18268,8 +17205,8 @@
         </p:nvSpPr>
         <p:spPr>
           <a:xfrm>
-            <a:off x="5545488" y="3580404"/>
-            <a:ext cx="1709341" cy="646331"/>
+            <a:off x="1658595" y="4545933"/>
+            <a:ext cx="1567848" cy="400110"/>
           </a:xfrm>
           <a:prstGeom prst="rect">
             <a:avLst/>
@@ -18300,26 +17237,19 @@
           <a:p>
             <a:pPr algn="ctr"/>
             <a:r>
-              <a:rPr lang="en-US" sz="1800" dirty="0"/>
-              <a:t>40-D</a:t>
+              <a:rPr lang="en-US" altLang="zh-CN" sz="2000" dirty="0"/>
+              <a:t>Embedding</a:t>
             </a:r>
-          </a:p>
-          <a:p>
-            <a:pPr algn="ctr"/>
-            <a:r>
-              <a:rPr lang="en-US" sz="1800" dirty="0"/>
-              <a:t>Vectors</a:t>
-            </a:r>
-            <a:endParaRPr sz="1800" dirty="0"/>
+            <a:endParaRPr sz="2000" dirty="0"/>
           </a:p>
         </p:txBody>
       </p:sp>
       <p:sp>
         <p:nvSpPr>
-          <p:cNvPr id="39" name="文本框 10">
+          <p:cNvPr id="42" name="文本框 10">
             <a:extLst>
               <a:ext uri="{FF2B5EF4-FFF2-40B4-BE49-F238E27FC236}">
-                <a16:creationId xmlns:a16="http://schemas.microsoft.com/office/drawing/2014/main" id="{A83406F5-ADC2-40E6-A751-5281C8F1C0F7}"/>
+                <a16:creationId xmlns:a16="http://schemas.microsoft.com/office/drawing/2014/main" id="{42C868CA-CDFB-4756-9B82-872DC8756668}"/>
               </a:ext>
             </a:extLst>
           </p:cNvPr>
@@ -18328,7 +17258,7 @@
         </p:nvSpPr>
         <p:spPr>
           <a:xfrm>
-            <a:off x="1464009" y="4674504"/>
+            <a:off x="4542715" y="3489002"/>
             <a:ext cx="1567848" cy="400110"/>
           </a:xfrm>
           <a:prstGeom prst="rect">
@@ -18360,8 +17290,8 @@
           <a:p>
             <a:pPr algn="ctr"/>
             <a:r>
-              <a:rPr lang="en-US" altLang="zh-CN" sz="2000" dirty="0"/>
-              <a:t>Embedding</a:t>
+              <a:rPr lang="en-US" sz="2000" dirty="0"/>
+              <a:t>Encoder</a:t>
             </a:r>
             <a:endParaRPr sz="2000" dirty="0"/>
           </a:p>
@@ -18369,10 +17299,10 @@
       </p:sp>
       <p:sp>
         <p:nvSpPr>
-          <p:cNvPr id="42" name="文本框 10">
+          <p:cNvPr id="43" name="文本框 10">
             <a:extLst>
               <a:ext uri="{FF2B5EF4-FFF2-40B4-BE49-F238E27FC236}">
-                <a16:creationId xmlns:a16="http://schemas.microsoft.com/office/drawing/2014/main" id="{42C868CA-CDFB-4756-9B82-872DC8756668}"/>
+                <a16:creationId xmlns:a16="http://schemas.microsoft.com/office/drawing/2014/main" id="{EFC0A8D1-99D1-47DA-9F2F-E5CC293F70B8}"/>
               </a:ext>
             </a:extLst>
           </p:cNvPr>
@@ -18381,8 +17311,8 @@
         </p:nvSpPr>
         <p:spPr>
           <a:xfrm>
-            <a:off x="4204510" y="4707508"/>
-            <a:ext cx="1567848" cy="400110"/>
+            <a:off x="8283771" y="835690"/>
+            <a:ext cx="1709341" cy="646331"/>
           </a:xfrm>
           <a:prstGeom prst="rect">
             <a:avLst/>
@@ -18413,19 +17343,26 @@
           <a:p>
             <a:pPr algn="ctr"/>
             <a:r>
-              <a:rPr lang="en-US" sz="2000" dirty="0"/>
-              <a:t>Encoder</a:t>
+              <a:rPr lang="en-US" sz="1800" dirty="0"/>
+              <a:t>2-D</a:t>
             </a:r>
-            <a:endParaRPr sz="2000" dirty="0"/>
+          </a:p>
+          <a:p>
+            <a:pPr algn="ctr"/>
+            <a:r>
+              <a:rPr lang="en-US" sz="1800" dirty="0"/>
+              <a:t>Vectors</a:t>
+            </a:r>
+            <a:endParaRPr sz="1800" dirty="0"/>
           </a:p>
         </p:txBody>
       </p:sp>
       <p:sp>
         <p:nvSpPr>
-          <p:cNvPr id="43" name="文本框 10">
+          <p:cNvPr id="44" name="文本框 10">
             <a:extLst>
               <a:ext uri="{FF2B5EF4-FFF2-40B4-BE49-F238E27FC236}">
-                <a16:creationId xmlns:a16="http://schemas.microsoft.com/office/drawing/2014/main" id="{EFC0A8D1-99D1-47DA-9F2F-E5CC293F70B8}"/>
+                <a16:creationId xmlns:a16="http://schemas.microsoft.com/office/drawing/2014/main" id="{6A5A817B-EC58-4936-93CB-1D77CA96EEFE}"/>
               </a:ext>
             </a:extLst>
           </p:cNvPr>
@@ -18434,8 +17371,8 @@
         </p:nvSpPr>
         <p:spPr>
           <a:xfrm>
-            <a:off x="8283771" y="835690"/>
-            <a:ext cx="1709341" cy="646331"/>
+            <a:off x="8359880" y="3802051"/>
+            <a:ext cx="1709341" cy="369332"/>
           </a:xfrm>
           <a:prstGeom prst="rect">
             <a:avLst/>
@@ -18467,66 +17404,6 @@
             <a:pPr algn="ctr"/>
             <a:r>
               <a:rPr lang="en-US" sz="1800" dirty="0"/>
-              <a:t>2-D</a:t>
-            </a:r>
-          </a:p>
-          <a:p>
-            <a:pPr algn="ctr"/>
-            <a:r>
-              <a:rPr lang="en-US" sz="1800" dirty="0"/>
-              <a:t>Vectors</a:t>
-            </a:r>
-            <a:endParaRPr sz="1800" dirty="0"/>
-          </a:p>
-        </p:txBody>
-      </p:sp>
-      <p:sp>
-        <p:nvSpPr>
-          <p:cNvPr id="44" name="文本框 10">
-            <a:extLst>
-              <a:ext uri="{FF2B5EF4-FFF2-40B4-BE49-F238E27FC236}">
-                <a16:creationId xmlns:a16="http://schemas.microsoft.com/office/drawing/2014/main" id="{6A5A817B-EC58-4936-93CB-1D77CA96EEFE}"/>
-              </a:ext>
-            </a:extLst>
-          </p:cNvPr>
-          <p:cNvSpPr txBox="1"/>
-          <p:nvPr/>
-        </p:nvSpPr>
-        <p:spPr>
-          <a:xfrm>
-            <a:off x="8359880" y="3802051"/>
-            <a:ext cx="1709341" cy="369332"/>
-          </a:xfrm>
-          <a:prstGeom prst="rect">
-            <a:avLst/>
-          </a:prstGeom>
-          <a:ln w="12700">
-            <a:miter lim="400000"/>
-          </a:ln>
-          <a:extLst>
-            <a:ext uri="{C572A759-6A51-4108-AA02-DFA0A04FC94B}">
-              <ma14:wrappingTextBoxFlag xmlns:ma14="http://schemas.microsoft.com/office/mac/drawingml/2011/main" xmlns:a14="http://schemas.microsoft.com/office/drawing/2010/main" xmlns:m="http://schemas.openxmlformats.org/officeDocument/2006/math" xmlns="" val="1"/>
-            </a:ext>
-          </a:extLst>
-        </p:spPr>
-        <p:txBody>
-          <a:bodyPr wrap="square" lIns="45719" rIns="45719">
-            <a:spAutoFit/>
-          </a:bodyPr>
-          <a:lstStyle>
-            <a:lvl1pPr>
-              <a:defRPr sz="3200">
-                <a:latin typeface="微软雅黑"/>
-                <a:ea typeface="微软雅黑"/>
-                <a:cs typeface="微软雅黑"/>
-                <a:sym typeface="微软雅黑"/>
-              </a:defRPr>
-            </a:lvl1pPr>
-          </a:lstStyle>
-          <a:p>
-            <a:pPr algn="ctr"/>
-            <a:r>
-              <a:rPr lang="en-US" sz="1800" dirty="0"/>
               <a:t>Predictions</a:t>
             </a:r>
             <a:endParaRPr sz="1800" dirty="0"/>
@@ -18547,36 +17424,27 @@
         </p:nvSpPr>
         <p:spPr>
           <a:xfrm>
-            <a:off x="197947" y="2829198"/>
-            <a:ext cx="1244327" cy="732934"/>
+            <a:off x="196418" y="2825562"/>
+            <a:ext cx="971545" cy="524374"/>
           </a:xfrm>
           <a:prstGeom prst="rightArrow">
             <a:avLst/>
           </a:prstGeom>
-          <a:solidFill>
-            <a:srgbClr val="CCFF66"/>
-          </a:solidFill>
-          <a:ln w="12700" cap="flat">
-            <a:solidFill>
-              <a:schemeClr val="accent1"/>
-            </a:solidFill>
-            <a:prstDash val="solid"/>
-            <a:miter lim="800000"/>
-          </a:ln>
-          <a:effectLst/>
-          <a:sp3d/>
+          <a:ln/>
         </p:spPr>
         <p:style>
-          <a:lnRef idx="0">
-            <a:scrgbClr r="0" g="0" b="0"/>
+          <a:lnRef idx="2">
+            <a:schemeClr val="accent4"/>
           </a:lnRef>
-          <a:fillRef idx="0">
-            <a:scrgbClr r="0" g="0" b="0"/>
+          <a:fillRef idx="1">
+            <a:schemeClr val="lt1"/>
           </a:fillRef>
           <a:effectRef idx="0">
-            <a:scrgbClr r="0" g="0" b="0"/>
+            <a:schemeClr val="accent4"/>
           </a:effectRef>
-          <a:fontRef idx="none"/>
+          <a:fontRef idx="minor">
+            <a:schemeClr val="dk1"/>
+          </a:fontRef>
         </p:style>
         <p:txBody>
           <a:bodyPr rot="0" spcFirstLastPara="1" vertOverflow="overflow" horzOverflow="overflow" vert="horz" wrap="square" lIns="45719" tIns="45719" rIns="45719" bIns="45719" numCol="1" spcCol="38100" rtlCol="0" anchor="ctr">
@@ -18714,6 +17582,1326 @@
           </a:p>
           <a:p>
             <a:endParaRPr sz="2000" dirty="0"/>
+          </a:p>
+        </p:txBody>
+      </p:sp>
+      <p:sp>
+        <p:nvSpPr>
+          <p:cNvPr id="3" name="矩形: 圆角 2">
+            <a:extLst>
+              <a:ext uri="{FF2B5EF4-FFF2-40B4-BE49-F238E27FC236}">
+                <a16:creationId xmlns:a16="http://schemas.microsoft.com/office/drawing/2014/main" id="{D89F6454-8A1A-4B6B-923E-A9F0C4980E67}"/>
+              </a:ext>
+            </a:extLst>
+          </p:cNvPr>
+          <p:cNvSpPr/>
+          <p:nvPr/>
+        </p:nvSpPr>
+        <p:spPr>
+          <a:xfrm>
+            <a:off x="1267703" y="1736110"/>
+            <a:ext cx="2230257" cy="839254"/>
+          </a:xfrm>
+          <a:prstGeom prst="roundRect">
+            <a:avLst/>
+          </a:prstGeom>
+          <a:ln/>
+        </p:spPr>
+        <p:style>
+          <a:lnRef idx="1">
+            <a:schemeClr val="accent5"/>
+          </a:lnRef>
+          <a:fillRef idx="2">
+            <a:schemeClr val="accent5"/>
+          </a:fillRef>
+          <a:effectRef idx="1">
+            <a:schemeClr val="accent5"/>
+          </a:effectRef>
+          <a:fontRef idx="minor">
+            <a:schemeClr val="dk1"/>
+          </a:fontRef>
+        </p:style>
+        <p:txBody>
+          <a:bodyPr rot="0" spcFirstLastPara="1" vertOverflow="overflow" horzOverflow="overflow" vert="horz" wrap="square" lIns="45719" tIns="45719" rIns="45719" bIns="45719" numCol="1" spcCol="38100" rtlCol="0" anchor="ctr">
+            <a:spAutoFit/>
+          </a:bodyPr>
+          <a:lstStyle/>
+          <a:p>
+            <a:pPr marL="0" marR="0" indent="0" algn="l" defTabSz="914400" rtl="0" fontAlgn="auto" latinLnBrk="0" hangingPunct="0">
+              <a:lnSpc>
+                <a:spcPct val="100000"/>
+              </a:lnSpc>
+              <a:spcBef>
+                <a:spcPts val="0"/>
+              </a:spcBef>
+              <a:spcAft>
+                <a:spcPts val="0"/>
+              </a:spcAft>
+              <a:buClrTx/>
+              <a:buSzTx/>
+              <a:buFontTx/>
+              <a:buNone/>
+              <a:tabLst/>
+            </a:pPr>
+            <a:endParaRPr kumimoji="0" lang="zh-CN" altLang="en-US" sz="1800" b="0" i="0" u="none" strike="noStrike" cap="none" spc="0" normalizeH="0" baseline="0">
+              <a:ln>
+                <a:noFill/>
+              </a:ln>
+              <a:solidFill>
+                <a:srgbClr val="000000"/>
+              </a:solidFill>
+              <a:effectLst/>
+              <a:uFillTx/>
+              <a:latin typeface="+mj-lt"/>
+              <a:ea typeface="+mj-ea"/>
+              <a:cs typeface="+mj-cs"/>
+              <a:sym typeface="等线"/>
+            </a:endParaRPr>
+          </a:p>
+        </p:txBody>
+      </p:sp>
+      <p:sp>
+        <p:nvSpPr>
+          <p:cNvPr id="7" name="文本框 6">
+            <a:extLst>
+              <a:ext uri="{FF2B5EF4-FFF2-40B4-BE49-F238E27FC236}">
+                <a16:creationId xmlns:a16="http://schemas.microsoft.com/office/drawing/2014/main" id="{5DD2FB15-A385-4079-BF33-E71A3F6D5400}"/>
+              </a:ext>
+            </a:extLst>
+          </p:cNvPr>
+          <p:cNvSpPr txBox="1"/>
+          <p:nvPr/>
+        </p:nvSpPr>
+        <p:spPr>
+          <a:xfrm>
+            <a:off x="1387077" y="1929033"/>
+            <a:ext cx="2110884" cy="369330"/>
+          </a:xfrm>
+          <a:prstGeom prst="rect">
+            <a:avLst/>
+          </a:prstGeom>
+          <a:noFill/>
+          <a:ln w="12700" cap="flat">
+            <a:noFill/>
+            <a:miter lim="400000"/>
+          </a:ln>
+          <a:effectLst/>
+          <a:sp3d/>
+        </p:spPr>
+        <p:style>
+          <a:lnRef idx="0">
+            <a:scrgbClr r="0" g="0" b="0"/>
+          </a:lnRef>
+          <a:fillRef idx="0">
+            <a:scrgbClr r="0" g="0" b="0"/>
+          </a:fillRef>
+          <a:effectRef idx="0">
+            <a:scrgbClr r="0" g="0" b="0"/>
+          </a:effectRef>
+          <a:fontRef idx="none"/>
+        </p:style>
+        <p:txBody>
+          <a:bodyPr rot="0" spcFirstLastPara="1" vertOverflow="overflow" horzOverflow="overflow" vert="horz" wrap="square" lIns="45719" tIns="45719" rIns="45719" bIns="45719" numCol="1" spcCol="38100" rtlCol="0" anchor="t">
+            <a:spAutoFit/>
+          </a:bodyPr>
+          <a:lstStyle/>
+          <a:p>
+            <a:pPr marL="0" marR="0" indent="0" algn="l" defTabSz="914400" rtl="0" fontAlgn="auto" latinLnBrk="0" hangingPunct="0">
+              <a:lnSpc>
+                <a:spcPct val="100000"/>
+              </a:lnSpc>
+              <a:spcBef>
+                <a:spcPts val="0"/>
+              </a:spcBef>
+              <a:spcAft>
+                <a:spcPts val="0"/>
+              </a:spcAft>
+              <a:buClrTx/>
+              <a:buSzTx/>
+              <a:buFontTx/>
+              <a:buNone/>
+              <a:tabLst/>
+            </a:pPr>
+            <a:r>
+              <a:rPr kumimoji="0" lang="en-US" altLang="zh-CN" b="1" i="0" u="none" strike="noStrike" cap="none" spc="0" normalizeH="0" baseline="0" dirty="0">
+                <a:ln>
+                  <a:noFill/>
+                </a:ln>
+                <a:solidFill>
+                  <a:srgbClr val="000000"/>
+                </a:solidFill>
+                <a:effectLst/>
+                <a:uFillTx/>
+                <a:latin typeface="Times New Roman" panose="02020603050405020304" pitchFamily="18" charset="0"/>
+                <a:cs typeface="Times New Roman" panose="02020603050405020304" pitchFamily="18" charset="0"/>
+                <a:sym typeface="等线"/>
+              </a:rPr>
+              <a:t>TokenTextEncoder</a:t>
+            </a:r>
+            <a:endParaRPr kumimoji="0" lang="zh-CN" altLang="en-US" b="1" i="0" u="none" strike="noStrike" cap="none" spc="0" normalizeH="0" baseline="0" dirty="0">
+              <a:ln>
+                <a:noFill/>
+              </a:ln>
+              <a:solidFill>
+                <a:srgbClr val="000000"/>
+              </a:solidFill>
+              <a:effectLst/>
+              <a:uFillTx/>
+              <a:latin typeface="Times New Roman" panose="02020603050405020304" pitchFamily="18" charset="0"/>
+              <a:cs typeface="Times New Roman" panose="02020603050405020304" pitchFamily="18" charset="0"/>
+              <a:sym typeface="等线"/>
+            </a:endParaRPr>
+          </a:p>
+        </p:txBody>
+      </p:sp>
+      <p:sp>
+        <p:nvSpPr>
+          <p:cNvPr id="41" name="矩形: 圆角 40">
+            <a:extLst>
+              <a:ext uri="{FF2B5EF4-FFF2-40B4-BE49-F238E27FC236}">
+                <a16:creationId xmlns:a16="http://schemas.microsoft.com/office/drawing/2014/main" id="{8F7F27F9-7ABC-453F-92C5-ADB2F14AEEEB}"/>
+              </a:ext>
+            </a:extLst>
+          </p:cNvPr>
+          <p:cNvSpPr/>
+          <p:nvPr/>
+        </p:nvSpPr>
+        <p:spPr>
+          <a:xfrm>
+            <a:off x="1277623" y="2705987"/>
+            <a:ext cx="2230257" cy="839254"/>
+          </a:xfrm>
+          <a:prstGeom prst="roundRect">
+            <a:avLst/>
+          </a:prstGeom>
+          <a:ln/>
+        </p:spPr>
+        <p:style>
+          <a:lnRef idx="1">
+            <a:schemeClr val="accent5"/>
+          </a:lnRef>
+          <a:fillRef idx="2">
+            <a:schemeClr val="accent5"/>
+          </a:fillRef>
+          <a:effectRef idx="1">
+            <a:schemeClr val="accent5"/>
+          </a:effectRef>
+          <a:fontRef idx="minor">
+            <a:schemeClr val="dk1"/>
+          </a:fontRef>
+        </p:style>
+        <p:txBody>
+          <a:bodyPr rot="0" spcFirstLastPara="1" vertOverflow="overflow" horzOverflow="overflow" vert="horz" wrap="square" lIns="45719" tIns="45719" rIns="45719" bIns="45719" numCol="1" spcCol="38100" rtlCol="0" anchor="ctr">
+            <a:spAutoFit/>
+          </a:bodyPr>
+          <a:lstStyle/>
+          <a:p>
+            <a:pPr marL="0" marR="0" indent="0" algn="l" defTabSz="914400" rtl="0" fontAlgn="auto" latinLnBrk="0" hangingPunct="0">
+              <a:lnSpc>
+                <a:spcPct val="100000"/>
+              </a:lnSpc>
+              <a:spcBef>
+                <a:spcPts val="0"/>
+              </a:spcBef>
+              <a:spcAft>
+                <a:spcPts val="0"/>
+              </a:spcAft>
+              <a:buClrTx/>
+              <a:buSzTx/>
+              <a:buFontTx/>
+              <a:buNone/>
+              <a:tabLst/>
+            </a:pPr>
+            <a:endParaRPr kumimoji="0" lang="zh-CN" altLang="en-US" sz="1800" b="0" i="0" u="none" strike="noStrike" cap="none" spc="0" normalizeH="0" baseline="0">
+              <a:ln>
+                <a:noFill/>
+              </a:ln>
+              <a:solidFill>
+                <a:srgbClr val="000000"/>
+              </a:solidFill>
+              <a:effectLst/>
+              <a:uFillTx/>
+              <a:latin typeface="+mj-lt"/>
+              <a:ea typeface="+mj-ea"/>
+              <a:cs typeface="+mj-cs"/>
+              <a:sym typeface="等线"/>
+            </a:endParaRPr>
+          </a:p>
+        </p:txBody>
+      </p:sp>
+      <p:sp>
+        <p:nvSpPr>
+          <p:cNvPr id="8" name="文本框 7">
+            <a:extLst>
+              <a:ext uri="{FF2B5EF4-FFF2-40B4-BE49-F238E27FC236}">
+                <a16:creationId xmlns:a16="http://schemas.microsoft.com/office/drawing/2014/main" id="{86663761-C8F0-4328-8C95-D8E511FF99CD}"/>
+              </a:ext>
+            </a:extLst>
+          </p:cNvPr>
+          <p:cNvSpPr txBox="1"/>
+          <p:nvPr/>
+        </p:nvSpPr>
+        <p:spPr>
+          <a:xfrm>
+            <a:off x="1391775" y="2958386"/>
+            <a:ext cx="2013826" cy="369330"/>
+          </a:xfrm>
+          <a:prstGeom prst="rect">
+            <a:avLst/>
+          </a:prstGeom>
+          <a:noFill/>
+          <a:ln w="12700" cap="flat">
+            <a:noFill/>
+            <a:miter lim="400000"/>
+          </a:ln>
+          <a:effectLst/>
+          <a:sp3d/>
+        </p:spPr>
+        <p:style>
+          <a:lnRef idx="0">
+            <a:scrgbClr r="0" g="0" b="0"/>
+          </a:lnRef>
+          <a:fillRef idx="0">
+            <a:scrgbClr r="0" g="0" b="0"/>
+          </a:fillRef>
+          <a:effectRef idx="0">
+            <a:scrgbClr r="0" g="0" b="0"/>
+          </a:effectRef>
+          <a:fontRef idx="none"/>
+        </p:style>
+        <p:txBody>
+          <a:bodyPr rot="0" spcFirstLastPara="1" vertOverflow="overflow" horzOverflow="overflow" vert="horz" wrap="square" lIns="45719" tIns="45719" rIns="45719" bIns="45719" numCol="1" spcCol="38100" rtlCol="0" anchor="t">
+            <a:spAutoFit/>
+          </a:bodyPr>
+          <a:lstStyle/>
+          <a:p>
+            <a:pPr marL="0" marR="0" indent="0" algn="ctr" defTabSz="914400" rtl="0" fontAlgn="auto" latinLnBrk="0" hangingPunct="0">
+              <a:lnSpc>
+                <a:spcPct val="100000"/>
+              </a:lnSpc>
+              <a:spcBef>
+                <a:spcPts val="0"/>
+              </a:spcBef>
+              <a:spcAft>
+                <a:spcPts val="0"/>
+              </a:spcAft>
+              <a:buClrTx/>
+              <a:buSzTx/>
+              <a:buFontTx/>
+              <a:buNone/>
+              <a:tabLst/>
+            </a:pPr>
+            <a:r>
+              <a:rPr kumimoji="0" lang="en-US" altLang="zh-CN" b="1" i="0" u="none" strike="noStrike" cap="none" spc="0" normalizeH="0" baseline="0" dirty="0">
+                <a:ln>
+                  <a:noFill/>
+                </a:ln>
+                <a:solidFill>
+                  <a:srgbClr val="000000"/>
+                </a:solidFill>
+                <a:effectLst/>
+                <a:uFillTx/>
+                <a:latin typeface="Times New Roman" panose="02020603050405020304" pitchFamily="18" charset="0"/>
+                <a:cs typeface="Times New Roman" panose="02020603050405020304" pitchFamily="18" charset="0"/>
+                <a:sym typeface="等线"/>
+              </a:rPr>
+              <a:t>Bert</a:t>
+            </a:r>
+            <a:endParaRPr kumimoji="0" lang="zh-CN" altLang="en-US" b="1" i="0" u="none" strike="noStrike" cap="none" spc="0" normalizeH="0" baseline="0" dirty="0">
+              <a:ln>
+                <a:noFill/>
+              </a:ln>
+              <a:solidFill>
+                <a:srgbClr val="000000"/>
+              </a:solidFill>
+              <a:effectLst/>
+              <a:uFillTx/>
+              <a:latin typeface="Times New Roman" panose="02020603050405020304" pitchFamily="18" charset="0"/>
+              <a:cs typeface="Times New Roman" panose="02020603050405020304" pitchFamily="18" charset="0"/>
+              <a:sym typeface="等线"/>
+            </a:endParaRPr>
+          </a:p>
+        </p:txBody>
+      </p:sp>
+      <p:sp>
+        <p:nvSpPr>
+          <p:cNvPr id="46" name="矩形: 圆角 45">
+            <a:extLst>
+              <a:ext uri="{FF2B5EF4-FFF2-40B4-BE49-F238E27FC236}">
+                <a16:creationId xmlns:a16="http://schemas.microsoft.com/office/drawing/2014/main" id="{B8F53B8D-3F00-448F-8276-53628B43256B}"/>
+              </a:ext>
+            </a:extLst>
+          </p:cNvPr>
+          <p:cNvSpPr/>
+          <p:nvPr/>
+        </p:nvSpPr>
+        <p:spPr>
+          <a:xfrm>
+            <a:off x="1269163" y="3675864"/>
+            <a:ext cx="2230257" cy="839254"/>
+          </a:xfrm>
+          <a:prstGeom prst="roundRect">
+            <a:avLst/>
+          </a:prstGeom>
+          <a:ln/>
+        </p:spPr>
+        <p:style>
+          <a:lnRef idx="1">
+            <a:schemeClr val="accent5"/>
+          </a:lnRef>
+          <a:fillRef idx="2">
+            <a:schemeClr val="accent5"/>
+          </a:fillRef>
+          <a:effectRef idx="1">
+            <a:schemeClr val="accent5"/>
+          </a:effectRef>
+          <a:fontRef idx="minor">
+            <a:schemeClr val="dk1"/>
+          </a:fontRef>
+        </p:style>
+        <p:txBody>
+          <a:bodyPr rot="0" spcFirstLastPara="1" vertOverflow="overflow" horzOverflow="overflow" vert="horz" wrap="square" lIns="45719" tIns="45719" rIns="45719" bIns="45719" numCol="1" spcCol="38100" rtlCol="0" anchor="ctr">
+            <a:spAutoFit/>
+          </a:bodyPr>
+          <a:lstStyle/>
+          <a:p>
+            <a:pPr marL="0" marR="0" indent="0" algn="l" defTabSz="914400" rtl="0" fontAlgn="auto" latinLnBrk="0" hangingPunct="0">
+              <a:lnSpc>
+                <a:spcPct val="100000"/>
+              </a:lnSpc>
+              <a:spcBef>
+                <a:spcPts val="0"/>
+              </a:spcBef>
+              <a:spcAft>
+                <a:spcPts val="0"/>
+              </a:spcAft>
+              <a:buClrTx/>
+              <a:buSzTx/>
+              <a:buFontTx/>
+              <a:buNone/>
+              <a:tabLst/>
+            </a:pPr>
+            <a:endParaRPr kumimoji="0" lang="zh-CN" altLang="en-US" sz="1800" b="0" i="0" u="none" strike="noStrike" cap="none" spc="0" normalizeH="0" baseline="0">
+              <a:ln>
+                <a:noFill/>
+              </a:ln>
+              <a:solidFill>
+                <a:srgbClr val="000000"/>
+              </a:solidFill>
+              <a:effectLst/>
+              <a:uFillTx/>
+              <a:latin typeface="+mj-lt"/>
+              <a:ea typeface="+mj-ea"/>
+              <a:cs typeface="+mj-cs"/>
+              <a:sym typeface="等线"/>
+            </a:endParaRPr>
+          </a:p>
+        </p:txBody>
+      </p:sp>
+      <p:sp>
+        <p:nvSpPr>
+          <p:cNvPr id="10" name="文本框 9">
+            <a:extLst>
+              <a:ext uri="{FF2B5EF4-FFF2-40B4-BE49-F238E27FC236}">
+                <a16:creationId xmlns:a16="http://schemas.microsoft.com/office/drawing/2014/main" id="{73FA6BEA-D7B5-447D-97EB-5A2DA2C4C78C}"/>
+              </a:ext>
+            </a:extLst>
+          </p:cNvPr>
+          <p:cNvSpPr txBox="1"/>
+          <p:nvPr/>
+        </p:nvSpPr>
+        <p:spPr>
+          <a:xfrm>
+            <a:off x="1444297" y="3906734"/>
+            <a:ext cx="1953135" cy="369330"/>
+          </a:xfrm>
+          <a:prstGeom prst="rect">
+            <a:avLst/>
+          </a:prstGeom>
+          <a:noFill/>
+          <a:ln w="12700" cap="flat">
+            <a:noFill/>
+            <a:miter lim="400000"/>
+          </a:ln>
+          <a:effectLst/>
+          <a:sp3d/>
+        </p:spPr>
+        <p:style>
+          <a:lnRef idx="0">
+            <a:scrgbClr r="0" g="0" b="0"/>
+          </a:lnRef>
+          <a:fillRef idx="0">
+            <a:scrgbClr r="0" g="0" b="0"/>
+          </a:fillRef>
+          <a:effectRef idx="0">
+            <a:scrgbClr r="0" g="0" b="0"/>
+          </a:effectRef>
+          <a:fontRef idx="none"/>
+        </p:style>
+        <p:txBody>
+          <a:bodyPr rot="0" spcFirstLastPara="1" vertOverflow="overflow" horzOverflow="overflow" vert="horz" wrap="square" lIns="45719" tIns="45719" rIns="45719" bIns="45719" numCol="1" spcCol="38100" rtlCol="0" anchor="t">
+            <a:spAutoFit/>
+          </a:bodyPr>
+          <a:lstStyle/>
+          <a:p>
+            <a:pPr marL="0" marR="0" indent="0" algn="ctr" defTabSz="914400" rtl="0" fontAlgn="auto" latinLnBrk="0" hangingPunct="0">
+              <a:lnSpc>
+                <a:spcPct val="100000"/>
+              </a:lnSpc>
+              <a:spcBef>
+                <a:spcPts val="0"/>
+              </a:spcBef>
+              <a:spcAft>
+                <a:spcPts val="0"/>
+              </a:spcAft>
+              <a:buClrTx/>
+              <a:buSzTx/>
+              <a:buFontTx/>
+              <a:buNone/>
+              <a:tabLst/>
+            </a:pPr>
+            <a:r>
+              <a:rPr kumimoji="0" lang="en-US" altLang="zh-CN" b="1" i="0" u="none" strike="noStrike" cap="none" spc="0" normalizeH="0" baseline="0" dirty="0">
+                <a:ln>
+                  <a:noFill/>
+                </a:ln>
+                <a:solidFill>
+                  <a:srgbClr val="000000"/>
+                </a:solidFill>
+                <a:effectLst/>
+                <a:uFillTx/>
+                <a:latin typeface="Times New Roman" panose="02020603050405020304" pitchFamily="18" charset="0"/>
+                <a:cs typeface="Times New Roman" panose="02020603050405020304" pitchFamily="18" charset="0"/>
+                <a:sym typeface="等线"/>
+              </a:rPr>
+              <a:t>GloVe</a:t>
+            </a:r>
+          </a:p>
+        </p:txBody>
+      </p:sp>
+      <p:sp>
+        <p:nvSpPr>
+          <p:cNvPr id="11" name="矩形: 圆角 10">
+            <a:extLst>
+              <a:ext uri="{FF2B5EF4-FFF2-40B4-BE49-F238E27FC236}">
+                <a16:creationId xmlns:a16="http://schemas.microsoft.com/office/drawing/2014/main" id="{A7B27883-94F0-4277-B38E-4600FCAD1B05}"/>
+              </a:ext>
+            </a:extLst>
+          </p:cNvPr>
+          <p:cNvSpPr/>
+          <p:nvPr/>
+        </p:nvSpPr>
+        <p:spPr>
+          <a:xfrm>
+            <a:off x="4602661" y="2705968"/>
+            <a:ext cx="1395025" cy="763562"/>
+          </a:xfrm>
+          <a:prstGeom prst="roundRect">
+            <a:avLst/>
+          </a:prstGeom>
+          <a:ln/>
+        </p:spPr>
+        <p:style>
+          <a:lnRef idx="1">
+            <a:schemeClr val="accent5"/>
+          </a:lnRef>
+          <a:fillRef idx="2">
+            <a:schemeClr val="accent5"/>
+          </a:fillRef>
+          <a:effectRef idx="1">
+            <a:schemeClr val="accent5"/>
+          </a:effectRef>
+          <a:fontRef idx="minor">
+            <a:schemeClr val="dk1"/>
+          </a:fontRef>
+        </p:style>
+        <p:txBody>
+          <a:bodyPr rot="0" spcFirstLastPara="1" vertOverflow="overflow" horzOverflow="overflow" vert="horz" wrap="square" lIns="45719" tIns="45719" rIns="45719" bIns="45719" numCol="1" spcCol="38100" rtlCol="0" anchor="ctr">
+            <a:spAutoFit/>
+          </a:bodyPr>
+          <a:lstStyle/>
+          <a:p>
+            <a:pPr marL="0" marR="0" indent="0" algn="l" defTabSz="914400" rtl="0" fontAlgn="auto" latinLnBrk="0" hangingPunct="0">
+              <a:lnSpc>
+                <a:spcPct val="100000"/>
+              </a:lnSpc>
+              <a:spcBef>
+                <a:spcPts val="0"/>
+              </a:spcBef>
+              <a:spcAft>
+                <a:spcPts val="0"/>
+              </a:spcAft>
+              <a:buClrTx/>
+              <a:buSzTx/>
+              <a:buFontTx/>
+              <a:buNone/>
+              <a:tabLst/>
+            </a:pPr>
+            <a:endParaRPr kumimoji="0" lang="zh-CN" altLang="en-US" sz="1800" b="0" i="0" u="none" strike="noStrike" cap="none" spc="0" normalizeH="0" baseline="0">
+              <a:ln>
+                <a:noFill/>
+              </a:ln>
+              <a:solidFill>
+                <a:srgbClr val="000000"/>
+              </a:solidFill>
+              <a:effectLst/>
+              <a:uFillTx/>
+              <a:latin typeface="+mj-lt"/>
+              <a:ea typeface="+mj-ea"/>
+              <a:cs typeface="+mj-cs"/>
+              <a:sym typeface="等线"/>
+            </a:endParaRPr>
+          </a:p>
+        </p:txBody>
+      </p:sp>
+      <p:sp>
+        <p:nvSpPr>
+          <p:cNvPr id="12" name="文本框 11">
+            <a:extLst>
+              <a:ext uri="{FF2B5EF4-FFF2-40B4-BE49-F238E27FC236}">
+                <a16:creationId xmlns:a16="http://schemas.microsoft.com/office/drawing/2014/main" id="{E6C16004-7E7F-4916-857D-ACBCDA76D3F6}"/>
+              </a:ext>
+            </a:extLst>
+          </p:cNvPr>
+          <p:cNvSpPr txBox="1"/>
+          <p:nvPr/>
+        </p:nvSpPr>
+        <p:spPr>
+          <a:xfrm>
+            <a:off x="4821980" y="2912820"/>
+            <a:ext cx="1009319" cy="369330"/>
+          </a:xfrm>
+          <a:prstGeom prst="rect">
+            <a:avLst/>
+          </a:prstGeom>
+          <a:noFill/>
+          <a:ln w="12700" cap="flat">
+            <a:noFill/>
+            <a:miter lim="400000"/>
+          </a:ln>
+          <a:effectLst/>
+          <a:sp3d/>
+        </p:spPr>
+        <p:style>
+          <a:lnRef idx="0">
+            <a:scrgbClr r="0" g="0" b="0"/>
+          </a:lnRef>
+          <a:fillRef idx="0">
+            <a:scrgbClr r="0" g="0" b="0"/>
+          </a:fillRef>
+          <a:effectRef idx="0">
+            <a:scrgbClr r="0" g="0" b="0"/>
+          </a:effectRef>
+          <a:fontRef idx="none"/>
+        </p:style>
+        <p:txBody>
+          <a:bodyPr rot="0" spcFirstLastPara="1" vertOverflow="overflow" horzOverflow="overflow" vert="horz" wrap="square" lIns="45719" tIns="45719" rIns="45719" bIns="45719" numCol="1" spcCol="38100" rtlCol="0" anchor="t">
+            <a:spAutoFit/>
+          </a:bodyPr>
+          <a:lstStyle/>
+          <a:p>
+            <a:pPr marL="0" marR="0" indent="0" algn="ctr" defTabSz="914400" rtl="0" fontAlgn="auto" latinLnBrk="0" hangingPunct="0">
+              <a:lnSpc>
+                <a:spcPct val="100000"/>
+              </a:lnSpc>
+              <a:spcBef>
+                <a:spcPts val="0"/>
+              </a:spcBef>
+              <a:spcAft>
+                <a:spcPts val="0"/>
+              </a:spcAft>
+              <a:buClrTx/>
+              <a:buSzTx/>
+              <a:buFontTx/>
+              <a:buNone/>
+              <a:tabLst/>
+            </a:pPr>
+            <a:r>
+              <a:rPr kumimoji="0" lang="en-US" altLang="zh-CN" b="1" i="0" u="none" strike="noStrike" cap="none" spc="0" normalizeH="0" baseline="0" dirty="0">
+                <a:ln>
+                  <a:noFill/>
+                </a:ln>
+                <a:solidFill>
+                  <a:srgbClr val="000000"/>
+                </a:solidFill>
+                <a:effectLst/>
+                <a:uFillTx/>
+                <a:latin typeface="Times New Roman" panose="02020603050405020304" pitchFamily="18" charset="0"/>
+                <a:cs typeface="Times New Roman" panose="02020603050405020304" pitchFamily="18" charset="0"/>
+                <a:sym typeface="等线"/>
+              </a:rPr>
+              <a:t>VAE</a:t>
+            </a:r>
+            <a:endParaRPr kumimoji="0" lang="zh-CN" altLang="en-US" b="1" i="0" u="none" strike="noStrike" cap="none" spc="0" normalizeH="0" baseline="0" dirty="0">
+              <a:ln>
+                <a:noFill/>
+              </a:ln>
+              <a:solidFill>
+                <a:srgbClr val="000000"/>
+              </a:solidFill>
+              <a:effectLst/>
+              <a:uFillTx/>
+              <a:latin typeface="Times New Roman" panose="02020603050405020304" pitchFamily="18" charset="0"/>
+              <a:cs typeface="Times New Roman" panose="02020603050405020304" pitchFamily="18" charset="0"/>
+              <a:sym typeface="等线"/>
+            </a:endParaRPr>
+          </a:p>
+        </p:txBody>
+      </p:sp>
+      <p:sp>
+        <p:nvSpPr>
+          <p:cNvPr id="47" name="矩形: 圆角 46">
+            <a:extLst>
+              <a:ext uri="{FF2B5EF4-FFF2-40B4-BE49-F238E27FC236}">
+                <a16:creationId xmlns:a16="http://schemas.microsoft.com/office/drawing/2014/main" id="{288F3968-6FEB-49D6-8B02-E4781BC6B691}"/>
+              </a:ext>
+            </a:extLst>
+          </p:cNvPr>
+          <p:cNvSpPr/>
+          <p:nvPr/>
+        </p:nvSpPr>
+        <p:spPr>
+          <a:xfrm>
+            <a:off x="7171510" y="1374004"/>
+            <a:ext cx="1395025" cy="763562"/>
+          </a:xfrm>
+          <a:prstGeom prst="roundRect">
+            <a:avLst/>
+          </a:prstGeom>
+          <a:ln/>
+        </p:spPr>
+        <p:style>
+          <a:lnRef idx="1">
+            <a:schemeClr val="accent5"/>
+          </a:lnRef>
+          <a:fillRef idx="2">
+            <a:schemeClr val="accent5"/>
+          </a:fillRef>
+          <a:effectRef idx="1">
+            <a:schemeClr val="accent5"/>
+          </a:effectRef>
+          <a:fontRef idx="minor">
+            <a:schemeClr val="dk1"/>
+          </a:fontRef>
+        </p:style>
+        <p:txBody>
+          <a:bodyPr rot="0" spcFirstLastPara="1" vertOverflow="overflow" horzOverflow="overflow" vert="horz" wrap="square" lIns="45719" tIns="45719" rIns="45719" bIns="45719" numCol="1" spcCol="38100" rtlCol="0" anchor="ctr">
+            <a:spAutoFit/>
+          </a:bodyPr>
+          <a:lstStyle/>
+          <a:p>
+            <a:pPr marL="0" marR="0" indent="0" algn="l" defTabSz="914400" rtl="0" fontAlgn="auto" latinLnBrk="0" hangingPunct="0">
+              <a:lnSpc>
+                <a:spcPct val="100000"/>
+              </a:lnSpc>
+              <a:spcBef>
+                <a:spcPts val="0"/>
+              </a:spcBef>
+              <a:spcAft>
+                <a:spcPts val="0"/>
+              </a:spcAft>
+              <a:buClrTx/>
+              <a:buSzTx/>
+              <a:buFontTx/>
+              <a:buNone/>
+              <a:tabLst/>
+            </a:pPr>
+            <a:endParaRPr kumimoji="0" lang="zh-CN" altLang="en-US" sz="1800" b="0" i="0" u="none" strike="noStrike" cap="none" spc="0" normalizeH="0" baseline="0">
+              <a:ln>
+                <a:noFill/>
+              </a:ln>
+              <a:solidFill>
+                <a:srgbClr val="000000"/>
+              </a:solidFill>
+              <a:effectLst/>
+              <a:uFillTx/>
+              <a:latin typeface="+mj-lt"/>
+              <a:ea typeface="+mj-ea"/>
+              <a:cs typeface="+mj-cs"/>
+              <a:sym typeface="等线"/>
+            </a:endParaRPr>
+          </a:p>
+        </p:txBody>
+      </p:sp>
+      <p:sp>
+        <p:nvSpPr>
+          <p:cNvPr id="48" name="文本框 47">
+            <a:extLst>
+              <a:ext uri="{FF2B5EF4-FFF2-40B4-BE49-F238E27FC236}">
+                <a16:creationId xmlns:a16="http://schemas.microsoft.com/office/drawing/2014/main" id="{1B692C77-1E6C-40EA-AB6F-42617E99ADAF}"/>
+              </a:ext>
+            </a:extLst>
+          </p:cNvPr>
+          <p:cNvSpPr txBox="1"/>
+          <p:nvPr/>
+        </p:nvSpPr>
+        <p:spPr>
+          <a:xfrm>
+            <a:off x="7390829" y="1580856"/>
+            <a:ext cx="1009319" cy="369330"/>
+          </a:xfrm>
+          <a:prstGeom prst="rect">
+            <a:avLst/>
+          </a:prstGeom>
+          <a:noFill/>
+          <a:ln w="12700" cap="flat">
+            <a:noFill/>
+            <a:miter lim="400000"/>
+          </a:ln>
+          <a:effectLst/>
+          <a:sp3d/>
+        </p:spPr>
+        <p:style>
+          <a:lnRef idx="0">
+            <a:scrgbClr r="0" g="0" b="0"/>
+          </a:lnRef>
+          <a:fillRef idx="0">
+            <a:scrgbClr r="0" g="0" b="0"/>
+          </a:fillRef>
+          <a:effectRef idx="0">
+            <a:scrgbClr r="0" g="0" b="0"/>
+          </a:effectRef>
+          <a:fontRef idx="none"/>
+        </p:style>
+        <p:txBody>
+          <a:bodyPr rot="0" spcFirstLastPara="1" vertOverflow="overflow" horzOverflow="overflow" vert="horz" wrap="square" lIns="45719" tIns="45719" rIns="45719" bIns="45719" numCol="1" spcCol="38100" rtlCol="0" anchor="t">
+            <a:spAutoFit/>
+          </a:bodyPr>
+          <a:lstStyle/>
+          <a:p>
+            <a:pPr marL="0" marR="0" indent="0" algn="ctr" defTabSz="914400" rtl="0" fontAlgn="auto" latinLnBrk="0" hangingPunct="0">
+              <a:lnSpc>
+                <a:spcPct val="100000"/>
+              </a:lnSpc>
+              <a:spcBef>
+                <a:spcPts val="0"/>
+              </a:spcBef>
+              <a:spcAft>
+                <a:spcPts val="0"/>
+              </a:spcAft>
+              <a:buClrTx/>
+              <a:buSzTx/>
+              <a:buFontTx/>
+              <a:buNone/>
+              <a:tabLst/>
+            </a:pPr>
+            <a:r>
+              <a:rPr kumimoji="0" lang="en-US" altLang="zh-CN" b="1" i="0" u="none" strike="noStrike" cap="none" spc="0" normalizeH="0" baseline="0" dirty="0">
+                <a:ln>
+                  <a:noFill/>
+                </a:ln>
+                <a:solidFill>
+                  <a:srgbClr val="000000"/>
+                </a:solidFill>
+                <a:effectLst/>
+                <a:uFillTx/>
+                <a:latin typeface="Times New Roman" panose="02020603050405020304" pitchFamily="18" charset="0"/>
+                <a:cs typeface="Times New Roman" panose="02020603050405020304" pitchFamily="18" charset="0"/>
+                <a:sym typeface="等线"/>
+              </a:rPr>
+              <a:t>T-SNE</a:t>
+            </a:r>
+            <a:endParaRPr kumimoji="0" lang="zh-CN" altLang="en-US" b="1" i="0" u="none" strike="noStrike" cap="none" spc="0" normalizeH="0" baseline="0" dirty="0">
+              <a:ln>
+                <a:noFill/>
+              </a:ln>
+              <a:solidFill>
+                <a:srgbClr val="000000"/>
+              </a:solidFill>
+              <a:effectLst/>
+              <a:uFillTx/>
+              <a:latin typeface="Times New Roman" panose="02020603050405020304" pitchFamily="18" charset="0"/>
+              <a:cs typeface="Times New Roman" panose="02020603050405020304" pitchFamily="18" charset="0"/>
+              <a:sym typeface="等线"/>
+            </a:endParaRPr>
+          </a:p>
+        </p:txBody>
+      </p:sp>
+      <p:sp>
+        <p:nvSpPr>
+          <p:cNvPr id="49" name="矩形: 圆角 48">
+            <a:extLst>
+              <a:ext uri="{FF2B5EF4-FFF2-40B4-BE49-F238E27FC236}">
+                <a16:creationId xmlns:a16="http://schemas.microsoft.com/office/drawing/2014/main" id="{3D93E9D9-309A-49C2-A308-77B88CCE07DC}"/>
+              </a:ext>
+            </a:extLst>
+          </p:cNvPr>
+          <p:cNvSpPr/>
+          <p:nvPr/>
+        </p:nvSpPr>
+        <p:spPr>
+          <a:xfrm>
+            <a:off x="7238689" y="4075815"/>
+            <a:ext cx="1395025" cy="763562"/>
+          </a:xfrm>
+          <a:prstGeom prst="roundRect">
+            <a:avLst/>
+          </a:prstGeom>
+          <a:ln/>
+        </p:spPr>
+        <p:style>
+          <a:lnRef idx="1">
+            <a:schemeClr val="accent5"/>
+          </a:lnRef>
+          <a:fillRef idx="2">
+            <a:schemeClr val="accent5"/>
+          </a:fillRef>
+          <a:effectRef idx="1">
+            <a:schemeClr val="accent5"/>
+          </a:effectRef>
+          <a:fontRef idx="minor">
+            <a:schemeClr val="dk1"/>
+          </a:fontRef>
+        </p:style>
+        <p:txBody>
+          <a:bodyPr rot="0" spcFirstLastPara="1" vertOverflow="overflow" horzOverflow="overflow" vert="horz" wrap="square" lIns="45719" tIns="45719" rIns="45719" bIns="45719" numCol="1" spcCol="38100" rtlCol="0" anchor="ctr">
+            <a:spAutoFit/>
+          </a:bodyPr>
+          <a:lstStyle/>
+          <a:p>
+            <a:pPr marL="0" marR="0" indent="0" algn="l" defTabSz="914400" rtl="0" fontAlgn="auto" latinLnBrk="0" hangingPunct="0">
+              <a:lnSpc>
+                <a:spcPct val="100000"/>
+              </a:lnSpc>
+              <a:spcBef>
+                <a:spcPts val="0"/>
+              </a:spcBef>
+              <a:spcAft>
+                <a:spcPts val="0"/>
+              </a:spcAft>
+              <a:buClrTx/>
+              <a:buSzTx/>
+              <a:buFontTx/>
+              <a:buNone/>
+              <a:tabLst/>
+            </a:pPr>
+            <a:endParaRPr kumimoji="0" lang="zh-CN" altLang="en-US" sz="1800" b="0" i="0" u="none" strike="noStrike" cap="none" spc="0" normalizeH="0" baseline="0">
+              <a:ln>
+                <a:noFill/>
+              </a:ln>
+              <a:solidFill>
+                <a:srgbClr val="000000"/>
+              </a:solidFill>
+              <a:effectLst/>
+              <a:uFillTx/>
+              <a:latin typeface="+mj-lt"/>
+              <a:ea typeface="+mj-ea"/>
+              <a:cs typeface="+mj-cs"/>
+              <a:sym typeface="等线"/>
+            </a:endParaRPr>
+          </a:p>
+        </p:txBody>
+      </p:sp>
+      <p:sp>
+        <p:nvSpPr>
+          <p:cNvPr id="50" name="文本框 49">
+            <a:extLst>
+              <a:ext uri="{FF2B5EF4-FFF2-40B4-BE49-F238E27FC236}">
+                <a16:creationId xmlns:a16="http://schemas.microsoft.com/office/drawing/2014/main" id="{6D4BDC13-A674-41C3-BA95-2BBF4B972F74}"/>
+              </a:ext>
+            </a:extLst>
+          </p:cNvPr>
+          <p:cNvSpPr txBox="1"/>
+          <p:nvPr/>
+        </p:nvSpPr>
+        <p:spPr>
+          <a:xfrm>
+            <a:off x="7458008" y="4282667"/>
+            <a:ext cx="1009319" cy="369330"/>
+          </a:xfrm>
+          <a:prstGeom prst="rect">
+            <a:avLst/>
+          </a:prstGeom>
+          <a:noFill/>
+          <a:ln w="12700" cap="flat">
+            <a:noFill/>
+            <a:miter lim="400000"/>
+          </a:ln>
+          <a:effectLst/>
+          <a:sp3d/>
+        </p:spPr>
+        <p:style>
+          <a:lnRef idx="0">
+            <a:scrgbClr r="0" g="0" b="0"/>
+          </a:lnRef>
+          <a:fillRef idx="0">
+            <a:scrgbClr r="0" g="0" b="0"/>
+          </a:fillRef>
+          <a:effectRef idx="0">
+            <a:scrgbClr r="0" g="0" b="0"/>
+          </a:effectRef>
+          <a:fontRef idx="none"/>
+        </p:style>
+        <p:txBody>
+          <a:bodyPr rot="0" spcFirstLastPara="1" vertOverflow="overflow" horzOverflow="overflow" vert="horz" wrap="square" lIns="45719" tIns="45719" rIns="45719" bIns="45719" numCol="1" spcCol="38100" rtlCol="0" anchor="t">
+            <a:spAutoFit/>
+          </a:bodyPr>
+          <a:lstStyle/>
+          <a:p>
+            <a:pPr marL="0" marR="0" indent="0" algn="ctr" defTabSz="914400" rtl="0" fontAlgn="auto" latinLnBrk="0" hangingPunct="0">
+              <a:lnSpc>
+                <a:spcPct val="100000"/>
+              </a:lnSpc>
+              <a:spcBef>
+                <a:spcPts val="0"/>
+              </a:spcBef>
+              <a:spcAft>
+                <a:spcPts val="0"/>
+              </a:spcAft>
+              <a:buClrTx/>
+              <a:buSzTx/>
+              <a:buFontTx/>
+              <a:buNone/>
+              <a:tabLst/>
+            </a:pPr>
+            <a:r>
+              <a:rPr kumimoji="0" lang="en-US" altLang="zh-CN" b="1" i="0" u="none" strike="noStrike" cap="none" spc="0" normalizeH="0" baseline="0" dirty="0">
+                <a:ln>
+                  <a:noFill/>
+                </a:ln>
+                <a:solidFill>
+                  <a:srgbClr val="000000"/>
+                </a:solidFill>
+                <a:effectLst/>
+                <a:uFillTx/>
+                <a:latin typeface="Times New Roman" panose="02020603050405020304" pitchFamily="18" charset="0"/>
+                <a:cs typeface="Times New Roman" panose="02020603050405020304" pitchFamily="18" charset="0"/>
+                <a:sym typeface="等线"/>
+              </a:rPr>
+              <a:t>FCNN</a:t>
+            </a:r>
+            <a:endParaRPr kumimoji="0" lang="zh-CN" altLang="en-US" b="1" i="0" u="none" strike="noStrike" cap="none" spc="0" normalizeH="0" baseline="0" dirty="0">
+              <a:ln>
+                <a:noFill/>
+              </a:ln>
+              <a:solidFill>
+                <a:srgbClr val="000000"/>
+              </a:solidFill>
+              <a:effectLst/>
+              <a:uFillTx/>
+              <a:latin typeface="Times New Roman" panose="02020603050405020304" pitchFamily="18" charset="0"/>
+              <a:cs typeface="Times New Roman" panose="02020603050405020304" pitchFamily="18" charset="0"/>
+              <a:sym typeface="等线"/>
+            </a:endParaRPr>
+          </a:p>
+        </p:txBody>
+      </p:sp>
+      <p:sp>
+        <p:nvSpPr>
+          <p:cNvPr id="51" name="Arrow: Right 44">
+            <a:extLst>
+              <a:ext uri="{FF2B5EF4-FFF2-40B4-BE49-F238E27FC236}">
+                <a16:creationId xmlns:a16="http://schemas.microsoft.com/office/drawing/2014/main" id="{09C6FD5D-1313-47C7-80CA-925E022D4234}"/>
+              </a:ext>
+            </a:extLst>
+          </p:cNvPr>
+          <p:cNvSpPr/>
+          <p:nvPr/>
+        </p:nvSpPr>
+        <p:spPr>
+          <a:xfrm>
+            <a:off x="3574676" y="2872041"/>
+            <a:ext cx="971545" cy="524374"/>
+          </a:xfrm>
+          <a:prstGeom prst="rightArrow">
+            <a:avLst/>
+          </a:prstGeom>
+          <a:ln/>
+        </p:spPr>
+        <p:style>
+          <a:lnRef idx="2">
+            <a:schemeClr val="accent4"/>
+          </a:lnRef>
+          <a:fillRef idx="1">
+            <a:schemeClr val="lt1"/>
+          </a:fillRef>
+          <a:effectRef idx="0">
+            <a:schemeClr val="accent4"/>
+          </a:effectRef>
+          <a:fontRef idx="minor">
+            <a:schemeClr val="dk1"/>
+          </a:fontRef>
+        </p:style>
+        <p:txBody>
+          <a:bodyPr rot="0" spcFirstLastPara="1" vertOverflow="overflow" horzOverflow="overflow" vert="horz" wrap="square" lIns="45719" tIns="45719" rIns="45719" bIns="45719" numCol="1" spcCol="38100" rtlCol="0" anchor="ctr">
+            <a:spAutoFit/>
+          </a:bodyPr>
+          <a:lstStyle/>
+          <a:p>
+            <a:pPr marL="0" marR="0" indent="0" algn="l" defTabSz="914400" rtl="0" fontAlgn="auto" latinLnBrk="0" hangingPunct="0">
+              <a:lnSpc>
+                <a:spcPct val="100000"/>
+              </a:lnSpc>
+              <a:spcBef>
+                <a:spcPts val="0"/>
+              </a:spcBef>
+              <a:spcAft>
+                <a:spcPts val="0"/>
+              </a:spcAft>
+              <a:buClrTx/>
+              <a:buSzTx/>
+              <a:buFontTx/>
+              <a:buNone/>
+              <a:tabLst/>
+            </a:pPr>
+            <a:endParaRPr kumimoji="0" lang="zh-CN" altLang="en-US" sz="1800" b="0" i="0" u="none" strike="noStrike" cap="none" spc="0" normalizeH="0" baseline="0">
+              <a:ln>
+                <a:noFill/>
+              </a:ln>
+              <a:solidFill>
+                <a:srgbClr val="000000"/>
+              </a:solidFill>
+              <a:effectLst/>
+              <a:uFillTx/>
+              <a:latin typeface="+mj-lt"/>
+              <a:ea typeface="+mj-ea"/>
+              <a:cs typeface="+mj-cs"/>
+              <a:sym typeface="等线"/>
+            </a:endParaRPr>
+          </a:p>
+        </p:txBody>
+      </p:sp>
+      <p:sp>
+        <p:nvSpPr>
+          <p:cNvPr id="52" name="矩形: 圆角 51">
+            <a:extLst>
+              <a:ext uri="{FF2B5EF4-FFF2-40B4-BE49-F238E27FC236}">
+                <a16:creationId xmlns:a16="http://schemas.microsoft.com/office/drawing/2014/main" id="{9B5CE439-F893-4F8E-99BF-6F6386778D93}"/>
+              </a:ext>
+            </a:extLst>
+          </p:cNvPr>
+          <p:cNvSpPr/>
+          <p:nvPr/>
+        </p:nvSpPr>
+        <p:spPr>
+          <a:xfrm>
+            <a:off x="4621515" y="5021080"/>
+            <a:ext cx="1395025" cy="763562"/>
+          </a:xfrm>
+          <a:prstGeom prst="roundRect">
+            <a:avLst/>
+          </a:prstGeom>
+          <a:ln/>
+        </p:spPr>
+        <p:style>
+          <a:lnRef idx="1">
+            <a:schemeClr val="accent5"/>
+          </a:lnRef>
+          <a:fillRef idx="2">
+            <a:schemeClr val="accent5"/>
+          </a:fillRef>
+          <a:effectRef idx="1">
+            <a:schemeClr val="accent5"/>
+          </a:effectRef>
+          <a:fontRef idx="minor">
+            <a:schemeClr val="dk1"/>
+          </a:fontRef>
+        </p:style>
+        <p:txBody>
+          <a:bodyPr rot="0" spcFirstLastPara="1" vertOverflow="overflow" horzOverflow="overflow" vert="horz" wrap="square" lIns="45719" tIns="45719" rIns="45719" bIns="45719" numCol="1" spcCol="38100" rtlCol="0" anchor="ctr">
+            <a:spAutoFit/>
+          </a:bodyPr>
+          <a:lstStyle/>
+          <a:p>
+            <a:pPr marL="0" marR="0" indent="0" algn="l" defTabSz="914400" rtl="0" fontAlgn="auto" latinLnBrk="0" hangingPunct="0">
+              <a:lnSpc>
+                <a:spcPct val="100000"/>
+              </a:lnSpc>
+              <a:spcBef>
+                <a:spcPts val="0"/>
+              </a:spcBef>
+              <a:spcAft>
+                <a:spcPts val="0"/>
+              </a:spcAft>
+              <a:buClrTx/>
+              <a:buSzTx/>
+              <a:buFontTx/>
+              <a:buNone/>
+              <a:tabLst/>
+            </a:pPr>
+            <a:endParaRPr kumimoji="0" lang="zh-CN" altLang="en-US" sz="1800" b="0" i="0" u="none" strike="noStrike" cap="none" spc="0" normalizeH="0" baseline="0">
+              <a:ln>
+                <a:noFill/>
+              </a:ln>
+              <a:solidFill>
+                <a:srgbClr val="000000"/>
+              </a:solidFill>
+              <a:effectLst/>
+              <a:uFillTx/>
+              <a:latin typeface="+mj-lt"/>
+              <a:ea typeface="+mj-ea"/>
+              <a:cs typeface="+mj-cs"/>
+              <a:sym typeface="等线"/>
+            </a:endParaRPr>
+          </a:p>
+        </p:txBody>
+      </p:sp>
+      <p:sp>
+        <p:nvSpPr>
+          <p:cNvPr id="53" name="文本框 52">
+            <a:extLst>
+              <a:ext uri="{FF2B5EF4-FFF2-40B4-BE49-F238E27FC236}">
+                <a16:creationId xmlns:a16="http://schemas.microsoft.com/office/drawing/2014/main" id="{B7C0721D-B718-4981-93A9-44CA0C62F0A3}"/>
+              </a:ext>
+            </a:extLst>
+          </p:cNvPr>
+          <p:cNvSpPr txBox="1"/>
+          <p:nvPr/>
+        </p:nvSpPr>
+        <p:spPr>
+          <a:xfrm>
+            <a:off x="4734393" y="5218196"/>
+            <a:ext cx="1175706" cy="369330"/>
+          </a:xfrm>
+          <a:prstGeom prst="rect">
+            <a:avLst/>
+          </a:prstGeom>
+          <a:noFill/>
+          <a:ln w="12700" cap="flat">
+            <a:noFill/>
+            <a:miter lim="400000"/>
+          </a:ln>
+          <a:effectLst/>
+          <a:sp3d/>
+        </p:spPr>
+        <p:style>
+          <a:lnRef idx="0">
+            <a:scrgbClr r="0" g="0" b="0"/>
+          </a:lnRef>
+          <a:fillRef idx="0">
+            <a:scrgbClr r="0" g="0" b="0"/>
+          </a:fillRef>
+          <a:effectRef idx="0">
+            <a:scrgbClr r="0" g="0" b="0"/>
+          </a:effectRef>
+          <a:fontRef idx="none"/>
+        </p:style>
+        <p:txBody>
+          <a:bodyPr rot="0" spcFirstLastPara="1" vertOverflow="overflow" horzOverflow="overflow" vert="horz" wrap="square" lIns="45719" tIns="45719" rIns="45719" bIns="45719" numCol="1" spcCol="38100" rtlCol="0" anchor="t">
+            <a:spAutoFit/>
+          </a:bodyPr>
+          <a:lstStyle/>
+          <a:p>
+            <a:pPr marL="0" marR="0" indent="0" algn="ctr" defTabSz="914400" rtl="0" fontAlgn="auto" latinLnBrk="0" hangingPunct="0">
+              <a:lnSpc>
+                <a:spcPct val="100000"/>
+              </a:lnSpc>
+              <a:spcBef>
+                <a:spcPts val="0"/>
+              </a:spcBef>
+              <a:spcAft>
+                <a:spcPts val="0"/>
+              </a:spcAft>
+              <a:buClrTx/>
+              <a:buSzTx/>
+              <a:buFontTx/>
+              <a:buNone/>
+              <a:tabLst/>
+            </a:pPr>
+            <a:r>
+              <a:rPr kumimoji="0" lang="en-US" altLang="zh-CN" b="1" i="0" u="none" strike="noStrike" cap="none" spc="0" normalizeH="0" baseline="0" dirty="0">
+                <a:ln>
+                  <a:noFill/>
+                </a:ln>
+                <a:solidFill>
+                  <a:srgbClr val="000000"/>
+                </a:solidFill>
+                <a:effectLst/>
+                <a:uFillTx/>
+                <a:latin typeface="Times New Roman" panose="02020603050405020304" pitchFamily="18" charset="0"/>
+                <a:cs typeface="Times New Roman" panose="02020603050405020304" pitchFamily="18" charset="0"/>
+                <a:sym typeface="等线"/>
+              </a:rPr>
+              <a:t>Sentiment</a:t>
+            </a:r>
+            <a:endParaRPr kumimoji="0" lang="zh-CN" altLang="en-US" b="1" i="0" u="none" strike="noStrike" cap="none" spc="0" normalizeH="0" baseline="0" dirty="0">
+              <a:ln>
+                <a:noFill/>
+              </a:ln>
+              <a:solidFill>
+                <a:srgbClr val="000000"/>
+              </a:solidFill>
+              <a:effectLst/>
+              <a:uFillTx/>
+              <a:latin typeface="Times New Roman" panose="02020603050405020304" pitchFamily="18" charset="0"/>
+              <a:cs typeface="Times New Roman" panose="02020603050405020304" pitchFamily="18" charset="0"/>
+              <a:sym typeface="等线"/>
+            </a:endParaRPr>
+          </a:p>
+        </p:txBody>
+      </p:sp>
+      <p:sp>
+        <p:nvSpPr>
+          <p:cNvPr id="16" name="箭头: 上 15">
+            <a:extLst>
+              <a:ext uri="{FF2B5EF4-FFF2-40B4-BE49-F238E27FC236}">
+                <a16:creationId xmlns:a16="http://schemas.microsoft.com/office/drawing/2014/main" id="{ACD9B8D3-ACE7-4E84-9E9B-7A1C969C89E8}"/>
+              </a:ext>
+            </a:extLst>
+          </p:cNvPr>
+          <p:cNvSpPr/>
+          <p:nvPr/>
+        </p:nvSpPr>
+        <p:spPr>
+          <a:xfrm>
+            <a:off x="5026795" y="3906734"/>
+            <a:ext cx="546755" cy="932643"/>
+          </a:xfrm>
+          <a:prstGeom prst="upArrow">
+            <a:avLst/>
+          </a:prstGeom>
+          <a:ln/>
+        </p:spPr>
+        <p:style>
+          <a:lnRef idx="2">
+            <a:schemeClr val="accent6"/>
+          </a:lnRef>
+          <a:fillRef idx="1">
+            <a:schemeClr val="lt1"/>
+          </a:fillRef>
+          <a:effectRef idx="0">
+            <a:schemeClr val="accent6"/>
+          </a:effectRef>
+          <a:fontRef idx="minor">
+            <a:schemeClr val="dk1"/>
+          </a:fontRef>
+        </p:style>
+        <p:txBody>
+          <a:bodyPr rot="0" spcFirstLastPara="1" vertOverflow="overflow" horzOverflow="overflow" vert="horz" wrap="square" lIns="45719" tIns="45719" rIns="45719" bIns="45719" numCol="1" spcCol="38100" rtlCol="0" anchor="ctr">
+            <a:spAutoFit/>
+          </a:bodyPr>
+          <a:lstStyle/>
+          <a:p>
+            <a:pPr marL="0" marR="0" indent="0" algn="l" defTabSz="914400" rtl="0" fontAlgn="auto" latinLnBrk="0" hangingPunct="0">
+              <a:lnSpc>
+                <a:spcPct val="100000"/>
+              </a:lnSpc>
+              <a:spcBef>
+                <a:spcPts val="0"/>
+              </a:spcBef>
+              <a:spcAft>
+                <a:spcPts val="0"/>
+              </a:spcAft>
+              <a:buClrTx/>
+              <a:buSzTx/>
+              <a:buFontTx/>
+              <a:buNone/>
+              <a:tabLst/>
+            </a:pPr>
+            <a:endParaRPr kumimoji="0" lang="zh-CN" altLang="en-US" sz="1800" b="0" i="0" u="none" strike="noStrike" cap="none" spc="0" normalizeH="0" baseline="0">
+              <a:ln>
+                <a:noFill/>
+              </a:ln>
+              <a:solidFill>
+                <a:srgbClr val="000000"/>
+              </a:solidFill>
+              <a:effectLst/>
+              <a:uFillTx/>
+              <a:latin typeface="+mj-lt"/>
+              <a:ea typeface="+mj-ea"/>
+              <a:cs typeface="+mj-cs"/>
+              <a:sym typeface="等线"/>
+            </a:endParaRPr>
           </a:p>
         </p:txBody>
       </p:sp>

</xml_diff>